<commit_message>
Einleitung zur Systemarchitektur hinzugefügt
</commit_message>
<xml_diff>
--- a/Dokumente/entwurf/Präsentation/presentation.pptx
+++ b/Dokumente/entwurf/Präsentation/presentation.pptx
@@ -6,21 +6,22 @@
   </p:sldMasterIdLst>
   <p:sldIdLst>
     <p:sldId id="271" r:id="rId2"/>
-    <p:sldId id="256" r:id="rId3"/>
-    <p:sldId id="257" r:id="rId4"/>
-    <p:sldId id="259" r:id="rId5"/>
-    <p:sldId id="260" r:id="rId6"/>
-    <p:sldId id="261" r:id="rId7"/>
-    <p:sldId id="262" r:id="rId8"/>
-    <p:sldId id="263" r:id="rId9"/>
-    <p:sldId id="264" r:id="rId10"/>
-    <p:sldId id="265" r:id="rId11"/>
-    <p:sldId id="266" r:id="rId12"/>
-    <p:sldId id="270" r:id="rId13"/>
-    <p:sldId id="267" r:id="rId14"/>
-    <p:sldId id="268" r:id="rId15"/>
-    <p:sldId id="269" r:id="rId16"/>
-    <p:sldId id="258" r:id="rId17"/>
+    <p:sldId id="272" r:id="rId3"/>
+    <p:sldId id="256" r:id="rId4"/>
+    <p:sldId id="257" r:id="rId5"/>
+    <p:sldId id="259" r:id="rId6"/>
+    <p:sldId id="260" r:id="rId7"/>
+    <p:sldId id="261" r:id="rId8"/>
+    <p:sldId id="262" r:id="rId9"/>
+    <p:sldId id="263" r:id="rId10"/>
+    <p:sldId id="264" r:id="rId11"/>
+    <p:sldId id="265" r:id="rId12"/>
+    <p:sldId id="266" r:id="rId13"/>
+    <p:sldId id="270" r:id="rId14"/>
+    <p:sldId id="267" r:id="rId15"/>
+    <p:sldId id="268" r:id="rId16"/>
+    <p:sldId id="269" r:id="rId17"/>
+    <p:sldId id="258" r:id="rId18"/>
   </p:sldIdLst>
   <p:sldSz cx="12192000" cy="6858000"/>
   <p:notesSz cx="6858000" cy="9144000"/>
@@ -119,6 +120,11 @@
       </a:defRPr>
     </a:lvl9pPr>
   </p:defaultTextStyle>
+  <p:extLst>
+    <p:ext uri="{EFAFB233-063F-42B5-8137-9DF3F51BA10A}">
+      <p15:sldGuideLst xmlns:p15="http://schemas.microsoft.com/office/powerpoint/2012/main"/>
+    </p:ext>
+  </p:extLst>
 </p:presentation>
 </file>
 
@@ -269,7 +275,7 @@
           <a:p>
             <a:fld id="{2F142BB3-9F87-4F32-99CE-4A0033E6A1B6}" type="datetimeFigureOut">
               <a:rPr lang="de-DE" smtClean="0"/>
-              <a:t>14.12.2018</a:t>
+              <a:t>17.12.2018</a:t>
             </a:fld>
             <a:endParaRPr lang="de-DE"/>
           </a:p>
@@ -467,7 +473,7 @@
           <a:p>
             <a:fld id="{2F142BB3-9F87-4F32-99CE-4A0033E6A1B6}" type="datetimeFigureOut">
               <a:rPr lang="de-DE" smtClean="0"/>
-              <a:t>14.12.2018</a:t>
+              <a:t>17.12.2018</a:t>
             </a:fld>
             <a:endParaRPr lang="de-DE"/>
           </a:p>
@@ -675,7 +681,7 @@
           <a:p>
             <a:fld id="{2F142BB3-9F87-4F32-99CE-4A0033E6A1B6}" type="datetimeFigureOut">
               <a:rPr lang="de-DE" smtClean="0"/>
-              <a:t>14.12.2018</a:t>
+              <a:t>17.12.2018</a:t>
             </a:fld>
             <a:endParaRPr lang="de-DE"/>
           </a:p>
@@ -873,7 +879,7 @@
           <a:p>
             <a:fld id="{2F142BB3-9F87-4F32-99CE-4A0033E6A1B6}" type="datetimeFigureOut">
               <a:rPr lang="de-DE" smtClean="0"/>
-              <a:t>14.12.2018</a:t>
+              <a:t>17.12.2018</a:t>
             </a:fld>
             <a:endParaRPr lang="de-DE"/>
           </a:p>
@@ -1148,7 +1154,7 @@
           <a:p>
             <a:fld id="{2F142BB3-9F87-4F32-99CE-4A0033E6A1B6}" type="datetimeFigureOut">
               <a:rPr lang="de-DE" smtClean="0"/>
-              <a:t>14.12.2018</a:t>
+              <a:t>17.12.2018</a:t>
             </a:fld>
             <a:endParaRPr lang="de-DE"/>
           </a:p>
@@ -1413,7 +1419,7 @@
           <a:p>
             <a:fld id="{2F142BB3-9F87-4F32-99CE-4A0033E6A1B6}" type="datetimeFigureOut">
               <a:rPr lang="de-DE" smtClean="0"/>
-              <a:t>14.12.2018</a:t>
+              <a:t>17.12.2018</a:t>
             </a:fld>
             <a:endParaRPr lang="de-DE"/>
           </a:p>
@@ -1825,7 +1831,7 @@
           <a:p>
             <a:fld id="{2F142BB3-9F87-4F32-99CE-4A0033E6A1B6}" type="datetimeFigureOut">
               <a:rPr lang="de-DE" smtClean="0"/>
-              <a:t>14.12.2018</a:t>
+              <a:t>17.12.2018</a:t>
             </a:fld>
             <a:endParaRPr lang="de-DE"/>
           </a:p>
@@ -1966,7 +1972,7 @@
           <a:p>
             <a:fld id="{2F142BB3-9F87-4F32-99CE-4A0033E6A1B6}" type="datetimeFigureOut">
               <a:rPr lang="de-DE" smtClean="0"/>
-              <a:t>14.12.2018</a:t>
+              <a:t>17.12.2018</a:t>
             </a:fld>
             <a:endParaRPr lang="de-DE"/>
           </a:p>
@@ -2079,7 +2085,7 @@
           <a:p>
             <a:fld id="{2F142BB3-9F87-4F32-99CE-4A0033E6A1B6}" type="datetimeFigureOut">
               <a:rPr lang="de-DE" smtClean="0"/>
-              <a:t>14.12.2018</a:t>
+              <a:t>17.12.2018</a:t>
             </a:fld>
             <a:endParaRPr lang="de-DE"/>
           </a:p>
@@ -2390,7 +2396,7 @@
           <a:p>
             <a:fld id="{2F142BB3-9F87-4F32-99CE-4A0033E6A1B6}" type="datetimeFigureOut">
               <a:rPr lang="de-DE" smtClean="0"/>
-              <a:t>14.12.2018</a:t>
+              <a:t>17.12.2018</a:t>
             </a:fld>
             <a:endParaRPr lang="de-DE"/>
           </a:p>
@@ -2678,7 +2684,7 @@
           <a:p>
             <a:fld id="{2F142BB3-9F87-4F32-99CE-4A0033E6A1B6}" type="datetimeFigureOut">
               <a:rPr lang="de-DE" smtClean="0"/>
-              <a:t>14.12.2018</a:t>
+              <a:t>17.12.2018</a:t>
             </a:fld>
             <a:endParaRPr lang="de-DE"/>
           </a:p>
@@ -2919,7 +2925,7 @@
           <a:p>
             <a:fld id="{2F142BB3-9F87-4F32-99CE-4A0033E6A1B6}" type="datetimeFigureOut">
               <a:rPr lang="de-DE" smtClean="0"/>
-              <a:t>14.12.2018</a:t>
+              <a:t>17.12.2018</a:t>
             </a:fld>
             <a:endParaRPr lang="de-DE"/>
           </a:p>
@@ -3477,7 +3483,7 @@
           <p:cNvPr id="5" name="Grafik 4">
             <a:extLst>
               <a:ext uri="{FF2B5EF4-FFF2-40B4-BE49-F238E27FC236}">
-                <a16:creationId xmlns:a16="http://schemas.microsoft.com/office/drawing/2014/main" id="{8FD8BA4B-610D-42A5-824B-774469A6FD64}"/>
+                <a16:creationId xmlns:a16="http://schemas.microsoft.com/office/drawing/2014/main" id="{50EC97F4-660D-4820-B36C-55EE4EDA34A2}"/>
               </a:ext>
             </a:extLst>
           </p:cNvPr>
@@ -3511,7 +3517,7 @@
     </p:spTree>
     <p:extLst>
       <p:ext uri="{BB962C8B-B14F-4D97-AF65-F5344CB8AC3E}">
-        <p14:creationId xmlns:p14="http://schemas.microsoft.com/office/powerpoint/2010/main" val="1264235680"/>
+        <p14:creationId xmlns:p14="http://schemas.microsoft.com/office/powerpoint/2010/main" val="1760866963"/>
       </p:ext>
     </p:extLst>
   </p:cSld>
@@ -3543,7 +3549,7 @@
           <p:cNvPr id="5" name="Grafik 4">
             <a:extLst>
               <a:ext uri="{FF2B5EF4-FFF2-40B4-BE49-F238E27FC236}">
-                <a16:creationId xmlns:a16="http://schemas.microsoft.com/office/drawing/2014/main" id="{941D9FC7-3DA1-4996-89EE-1028D98719E5}"/>
+                <a16:creationId xmlns:a16="http://schemas.microsoft.com/office/drawing/2014/main" id="{8FD8BA4B-610D-42A5-824B-774469A6FD64}"/>
               </a:ext>
             </a:extLst>
           </p:cNvPr>
@@ -3577,7 +3583,7 @@
     </p:spTree>
     <p:extLst>
       <p:ext uri="{BB962C8B-B14F-4D97-AF65-F5344CB8AC3E}">
-        <p14:creationId xmlns:p14="http://schemas.microsoft.com/office/powerpoint/2010/main" val="3087959542"/>
+        <p14:creationId xmlns:p14="http://schemas.microsoft.com/office/powerpoint/2010/main" val="1264235680"/>
       </p:ext>
     </p:extLst>
   </p:cSld>
@@ -3609,7 +3615,7 @@
           <p:cNvPr id="5" name="Grafik 4">
             <a:extLst>
               <a:ext uri="{FF2B5EF4-FFF2-40B4-BE49-F238E27FC236}">
-                <a16:creationId xmlns:a16="http://schemas.microsoft.com/office/drawing/2014/main" id="{F96276B3-4E3F-48A6-8993-7EDE756DBDCC}"/>
+                <a16:creationId xmlns:a16="http://schemas.microsoft.com/office/drawing/2014/main" id="{941D9FC7-3DA1-4996-89EE-1028D98719E5}"/>
               </a:ext>
             </a:extLst>
           </p:cNvPr>
@@ -3643,7 +3649,7 @@
     </p:spTree>
     <p:extLst>
       <p:ext uri="{BB962C8B-B14F-4D97-AF65-F5344CB8AC3E}">
-        <p14:creationId xmlns:p14="http://schemas.microsoft.com/office/powerpoint/2010/main" val="530274494"/>
+        <p14:creationId xmlns:p14="http://schemas.microsoft.com/office/powerpoint/2010/main" val="3087959542"/>
       </p:ext>
     </p:extLst>
   </p:cSld>
@@ -3675,7 +3681,7 @@
           <p:cNvPr id="5" name="Grafik 4">
             <a:extLst>
               <a:ext uri="{FF2B5EF4-FFF2-40B4-BE49-F238E27FC236}">
-                <a16:creationId xmlns:a16="http://schemas.microsoft.com/office/drawing/2014/main" id="{4B5A0DDE-AA26-4967-8DAE-F53BDAAFDF22}"/>
+                <a16:creationId xmlns:a16="http://schemas.microsoft.com/office/drawing/2014/main" id="{F96276B3-4E3F-48A6-8993-7EDE756DBDCC}"/>
               </a:ext>
             </a:extLst>
           </p:cNvPr>
@@ -3709,7 +3715,7 @@
     </p:spTree>
     <p:extLst>
       <p:ext uri="{BB962C8B-B14F-4D97-AF65-F5344CB8AC3E}">
-        <p14:creationId xmlns:p14="http://schemas.microsoft.com/office/powerpoint/2010/main" val="728054354"/>
+        <p14:creationId xmlns:p14="http://schemas.microsoft.com/office/powerpoint/2010/main" val="530274494"/>
       </p:ext>
     </p:extLst>
   </p:cSld>
@@ -3741,7 +3747,7 @@
           <p:cNvPr id="5" name="Grafik 4">
             <a:extLst>
               <a:ext uri="{FF2B5EF4-FFF2-40B4-BE49-F238E27FC236}">
-                <a16:creationId xmlns:a16="http://schemas.microsoft.com/office/drawing/2014/main" id="{7A8F1CC6-0642-4502-ADAC-E4D1A50577D6}"/>
+                <a16:creationId xmlns:a16="http://schemas.microsoft.com/office/drawing/2014/main" id="{4B5A0DDE-AA26-4967-8DAE-F53BDAAFDF22}"/>
               </a:ext>
             </a:extLst>
           </p:cNvPr>
@@ -3775,7 +3781,7 @@
     </p:spTree>
     <p:extLst>
       <p:ext uri="{BB962C8B-B14F-4D97-AF65-F5344CB8AC3E}">
-        <p14:creationId xmlns:p14="http://schemas.microsoft.com/office/powerpoint/2010/main" val="1223576011"/>
+        <p14:creationId xmlns:p14="http://schemas.microsoft.com/office/powerpoint/2010/main" val="728054354"/>
       </p:ext>
     </p:extLst>
   </p:cSld>
@@ -3807,6 +3813,72 @@
           <p:cNvPr id="5" name="Grafik 4">
             <a:extLst>
               <a:ext uri="{FF2B5EF4-FFF2-40B4-BE49-F238E27FC236}">
+                <a16:creationId xmlns:a16="http://schemas.microsoft.com/office/drawing/2014/main" id="{7A8F1CC6-0642-4502-ADAC-E4D1A50577D6}"/>
+              </a:ext>
+            </a:extLst>
+          </p:cNvPr>
+          <p:cNvPicPr>
+            <a:picLocks noChangeAspect="1"/>
+          </p:cNvPicPr>
+          <p:nvPr/>
+        </p:nvPicPr>
+        <p:blipFill>
+          <a:blip r:embed="rId2">
+            <a:extLst>
+              <a:ext uri="{28A0092B-C50C-407E-A947-70E740481C1C}">
+                <a14:useLocalDpi xmlns:a14="http://schemas.microsoft.com/office/drawing/2010/main" val="0"/>
+              </a:ext>
+            </a:extLst>
+          </a:blip>
+          <a:stretch>
+            <a:fillRect/>
+          </a:stretch>
+        </p:blipFill>
+        <p:spPr>
+          <a:xfrm>
+            <a:off x="2183883" y="306000"/>
+            <a:ext cx="7824233" cy="6552000"/>
+          </a:xfrm>
+          <a:prstGeom prst="rect">
+            <a:avLst/>
+          </a:prstGeom>
+        </p:spPr>
+      </p:pic>
+    </p:spTree>
+    <p:extLst>
+      <p:ext uri="{BB962C8B-B14F-4D97-AF65-F5344CB8AC3E}">
+        <p14:creationId xmlns:p14="http://schemas.microsoft.com/office/powerpoint/2010/main" val="1223576011"/>
+      </p:ext>
+    </p:extLst>
+  </p:cSld>
+  <p:clrMapOvr>
+    <a:masterClrMapping/>
+  </p:clrMapOvr>
+</p:sld>
+</file>
+
+<file path=ppt/slides/slide16.xml><?xml version="1.0" encoding="utf-8"?>
+<p:sld xmlns:a="http://schemas.openxmlformats.org/drawingml/2006/main" xmlns:r="http://schemas.openxmlformats.org/officeDocument/2006/relationships" xmlns:p="http://schemas.openxmlformats.org/presentationml/2006/main">
+  <p:cSld>
+    <p:spTree>
+      <p:nvGrpSpPr>
+        <p:cNvPr id="1" name=""/>
+        <p:cNvGrpSpPr/>
+        <p:nvPr/>
+      </p:nvGrpSpPr>
+      <p:grpSpPr>
+        <a:xfrm>
+          <a:off x="0" y="0"/>
+          <a:ext cx="0" cy="0"/>
+          <a:chOff x="0" y="0"/>
+          <a:chExt cx="0" cy="0"/>
+        </a:xfrm>
+      </p:grpSpPr>
+      <p:pic>
+        <p:nvPicPr>
+          <p:cNvPr id="5" name="Grafik 4">
+            <a:extLst>
+              <a:ext uri="{FF2B5EF4-FFF2-40B4-BE49-F238E27FC236}">
                 <a16:creationId xmlns:a16="http://schemas.microsoft.com/office/drawing/2014/main" id="{0BAA8F57-3776-4752-AADA-D238F40FD74F}"/>
               </a:ext>
             </a:extLst>
@@ -3851,7 +3923,7 @@
 </p:sld>
 </file>
 
-<file path=ppt/slides/slide16.xml><?xml version="1.0" encoding="utf-8"?>
+<file path=ppt/slides/slide17.xml><?xml version="1.0" encoding="utf-8"?>
 <p:sld xmlns:a="http://schemas.openxmlformats.org/drawingml/2006/main" xmlns:r="http://schemas.openxmlformats.org/officeDocument/2006/relationships" xmlns:p="http://schemas.openxmlformats.org/presentationml/2006/main">
   <p:cSld>
     <p:spTree>
@@ -3934,46 +4006,10 @@
           <a:chExt cx="0" cy="0"/>
         </a:xfrm>
       </p:grpSpPr>
-      <p:pic>
-        <p:nvPicPr>
-          <p:cNvPr id="5" name="Grafik 4">
-            <a:extLst>
-              <a:ext uri="{FF2B5EF4-FFF2-40B4-BE49-F238E27FC236}">
-                <a16:creationId xmlns:a16="http://schemas.microsoft.com/office/drawing/2014/main" id="{55A5BE75-FD22-4DA1-98CE-11332EF2E14B}"/>
-              </a:ext>
-            </a:extLst>
-          </p:cNvPr>
-          <p:cNvPicPr>
-            <a:picLocks noChangeAspect="1"/>
-          </p:cNvPicPr>
-          <p:nvPr/>
-        </p:nvPicPr>
-        <p:blipFill>
-          <a:blip r:embed="rId2">
-            <a:extLst>
-              <a:ext uri="{28A0092B-C50C-407E-A947-70E740481C1C}">
-                <a14:useLocalDpi xmlns:a14="http://schemas.microsoft.com/office/drawing/2010/main" val="0"/>
-              </a:ext>
-            </a:extLst>
-          </a:blip>
-          <a:stretch>
-            <a:fillRect/>
-          </a:stretch>
-        </p:blipFill>
-        <p:spPr>
-          <a:xfrm>
-            <a:off x="0" y="1310268"/>
-            <a:ext cx="12192000" cy="4237463"/>
-          </a:xfrm>
-          <a:prstGeom prst="rect">
-            <a:avLst/>
-          </a:prstGeom>
-        </p:spPr>
-      </p:pic>
     </p:spTree>
     <p:extLst>
       <p:ext uri="{BB962C8B-B14F-4D97-AF65-F5344CB8AC3E}">
-        <p14:creationId xmlns:p14="http://schemas.microsoft.com/office/powerpoint/2010/main" val="986132482"/>
+        <p14:creationId xmlns:p14="http://schemas.microsoft.com/office/powerpoint/2010/main" val="754424468"/>
       </p:ext>
     </p:extLst>
   </p:cSld>
@@ -4002,10 +4038,10 @@
       </p:grpSpPr>
       <p:pic>
         <p:nvPicPr>
-          <p:cNvPr id="35" name="Grafik 34">
-            <a:extLst>
-              <a:ext uri="{FF2B5EF4-FFF2-40B4-BE49-F238E27FC236}">
-                <a16:creationId xmlns:a16="http://schemas.microsoft.com/office/drawing/2014/main" id="{09A97914-55CC-4809-B1E5-108E33BD5371}"/>
+          <p:cNvPr id="5" name="Grafik 4">
+            <a:extLst>
+              <a:ext uri="{FF2B5EF4-FFF2-40B4-BE49-F238E27FC236}">
+                <a16:creationId xmlns:a16="http://schemas.microsoft.com/office/drawing/2014/main" id="{55A5BE75-FD22-4DA1-98CE-11332EF2E14B}"/>
               </a:ext>
             </a:extLst>
           </p:cNvPr>
@@ -4028,8 +4064,8 @@
         </p:blipFill>
         <p:spPr>
           <a:xfrm>
-            <a:off x="2183883" y="306000"/>
-            <a:ext cx="7824233" cy="6552000"/>
+            <a:off x="159798" y="1365808"/>
+            <a:ext cx="11872404" cy="4126384"/>
           </a:xfrm>
           <a:prstGeom prst="rect">
             <a:avLst/>
@@ -4039,7 +4075,7 @@
     </p:spTree>
     <p:extLst>
       <p:ext uri="{BB962C8B-B14F-4D97-AF65-F5344CB8AC3E}">
-        <p14:creationId xmlns:p14="http://schemas.microsoft.com/office/powerpoint/2010/main" val="2541419344"/>
+        <p14:creationId xmlns:p14="http://schemas.microsoft.com/office/powerpoint/2010/main" val="986132482"/>
       </p:ext>
     </p:extLst>
   </p:cSld>
@@ -4068,10 +4104,10 @@
       </p:grpSpPr>
       <p:pic>
         <p:nvPicPr>
-          <p:cNvPr id="5" name="Grafik 4">
-            <a:extLst>
-              <a:ext uri="{FF2B5EF4-FFF2-40B4-BE49-F238E27FC236}">
-                <a16:creationId xmlns:a16="http://schemas.microsoft.com/office/drawing/2014/main" id="{27F00BAC-0B59-483C-B32C-095F0DE18B45}"/>
+          <p:cNvPr id="35" name="Grafik 34">
+            <a:extLst>
+              <a:ext uri="{FF2B5EF4-FFF2-40B4-BE49-F238E27FC236}">
+                <a16:creationId xmlns:a16="http://schemas.microsoft.com/office/drawing/2014/main" id="{09A97914-55CC-4809-B1E5-108E33BD5371}"/>
               </a:ext>
             </a:extLst>
           </p:cNvPr>
@@ -4105,7 +4141,7 @@
     </p:spTree>
     <p:extLst>
       <p:ext uri="{BB962C8B-B14F-4D97-AF65-F5344CB8AC3E}">
-        <p14:creationId xmlns:p14="http://schemas.microsoft.com/office/powerpoint/2010/main" val="3440145442"/>
+        <p14:creationId xmlns:p14="http://schemas.microsoft.com/office/powerpoint/2010/main" val="2541419344"/>
       </p:ext>
     </p:extLst>
   </p:cSld>
@@ -4137,7 +4173,7 @@
           <p:cNvPr id="5" name="Grafik 4">
             <a:extLst>
               <a:ext uri="{FF2B5EF4-FFF2-40B4-BE49-F238E27FC236}">
-                <a16:creationId xmlns:a16="http://schemas.microsoft.com/office/drawing/2014/main" id="{225945B7-A3F5-4508-9969-313A7A24A68B}"/>
+                <a16:creationId xmlns:a16="http://schemas.microsoft.com/office/drawing/2014/main" id="{27F00BAC-0B59-483C-B32C-095F0DE18B45}"/>
               </a:ext>
             </a:extLst>
           </p:cNvPr>
@@ -4171,7 +4207,7 @@
     </p:spTree>
     <p:extLst>
       <p:ext uri="{BB962C8B-B14F-4D97-AF65-F5344CB8AC3E}">
-        <p14:creationId xmlns:p14="http://schemas.microsoft.com/office/powerpoint/2010/main" val="2425096587"/>
+        <p14:creationId xmlns:p14="http://schemas.microsoft.com/office/powerpoint/2010/main" val="3440145442"/>
       </p:ext>
     </p:extLst>
   </p:cSld>
@@ -4203,7 +4239,7 @@
           <p:cNvPr id="5" name="Grafik 4">
             <a:extLst>
               <a:ext uri="{FF2B5EF4-FFF2-40B4-BE49-F238E27FC236}">
-                <a16:creationId xmlns:a16="http://schemas.microsoft.com/office/drawing/2014/main" id="{ECC4E61A-9FF8-4214-9D92-88306197F7D0}"/>
+                <a16:creationId xmlns:a16="http://schemas.microsoft.com/office/drawing/2014/main" id="{225945B7-A3F5-4508-9969-313A7A24A68B}"/>
               </a:ext>
             </a:extLst>
           </p:cNvPr>
@@ -4237,7 +4273,7 @@
     </p:spTree>
     <p:extLst>
       <p:ext uri="{BB962C8B-B14F-4D97-AF65-F5344CB8AC3E}">
-        <p14:creationId xmlns:p14="http://schemas.microsoft.com/office/powerpoint/2010/main" val="1192347373"/>
+        <p14:creationId xmlns:p14="http://schemas.microsoft.com/office/powerpoint/2010/main" val="2425096587"/>
       </p:ext>
     </p:extLst>
   </p:cSld>
@@ -4269,7 +4305,7 @@
           <p:cNvPr id="5" name="Grafik 4">
             <a:extLst>
               <a:ext uri="{FF2B5EF4-FFF2-40B4-BE49-F238E27FC236}">
-                <a16:creationId xmlns:a16="http://schemas.microsoft.com/office/drawing/2014/main" id="{8889DBAE-E3AC-4460-A068-F4E8A5573887}"/>
+                <a16:creationId xmlns:a16="http://schemas.microsoft.com/office/drawing/2014/main" id="{ECC4E61A-9FF8-4214-9D92-88306197F7D0}"/>
               </a:ext>
             </a:extLst>
           </p:cNvPr>
@@ -4303,7 +4339,7 @@
     </p:spTree>
     <p:extLst>
       <p:ext uri="{BB962C8B-B14F-4D97-AF65-F5344CB8AC3E}">
-        <p14:creationId xmlns:p14="http://schemas.microsoft.com/office/powerpoint/2010/main" val="391111201"/>
+        <p14:creationId xmlns:p14="http://schemas.microsoft.com/office/powerpoint/2010/main" val="1192347373"/>
       </p:ext>
     </p:extLst>
   </p:cSld>
@@ -4335,7 +4371,7 @@
           <p:cNvPr id="5" name="Grafik 4">
             <a:extLst>
               <a:ext uri="{FF2B5EF4-FFF2-40B4-BE49-F238E27FC236}">
-                <a16:creationId xmlns:a16="http://schemas.microsoft.com/office/drawing/2014/main" id="{8F133A9B-17DF-46B0-A4F9-2653739A1080}"/>
+                <a16:creationId xmlns:a16="http://schemas.microsoft.com/office/drawing/2014/main" id="{8889DBAE-E3AC-4460-A068-F4E8A5573887}"/>
               </a:ext>
             </a:extLst>
           </p:cNvPr>
@@ -4369,7 +4405,7 @@
     </p:spTree>
     <p:extLst>
       <p:ext uri="{BB962C8B-B14F-4D97-AF65-F5344CB8AC3E}">
-        <p14:creationId xmlns:p14="http://schemas.microsoft.com/office/powerpoint/2010/main" val="760050037"/>
+        <p14:creationId xmlns:p14="http://schemas.microsoft.com/office/powerpoint/2010/main" val="391111201"/>
       </p:ext>
     </p:extLst>
   </p:cSld>
@@ -4401,7 +4437,7 @@
           <p:cNvPr id="5" name="Grafik 4">
             <a:extLst>
               <a:ext uri="{FF2B5EF4-FFF2-40B4-BE49-F238E27FC236}">
-                <a16:creationId xmlns:a16="http://schemas.microsoft.com/office/drawing/2014/main" id="{50EC97F4-660D-4820-B36C-55EE4EDA34A2}"/>
+                <a16:creationId xmlns:a16="http://schemas.microsoft.com/office/drawing/2014/main" id="{8F133A9B-17DF-46B0-A4F9-2653739A1080}"/>
               </a:ext>
             </a:extLst>
           </p:cNvPr>
@@ -4435,7 +4471,7 @@
     </p:spTree>
     <p:extLst>
       <p:ext uri="{BB962C8B-B14F-4D97-AF65-F5344CB8AC3E}">
-        <p14:creationId xmlns:p14="http://schemas.microsoft.com/office/powerpoint/2010/main" val="1760866963"/>
+        <p14:creationId xmlns:p14="http://schemas.microsoft.com/office/powerpoint/2010/main" val="760050037"/>
       </p:ext>
     </p:extLst>
   </p:cSld>

</xml_diff>

<commit_message>
Sequenzdiagramme verbessert und zur Präsentation hinzugefügt
</commit_message>
<xml_diff>
--- a/Dokumente/entwurf/Präsentation/presentation.pptx
+++ b/Dokumente/entwurf/Präsentation/presentation.pptx
@@ -24,6 +24,49 @@
     <p:sldId id="258" r:id="rId18"/>
     <p:sldId id="274" r:id="rId19"/>
     <p:sldId id="275" r:id="rId20"/>
+    <p:sldId id="276" r:id="rId21"/>
+    <p:sldId id="277" r:id="rId22"/>
+    <p:sldId id="278" r:id="rId23"/>
+    <p:sldId id="279" r:id="rId24"/>
+    <p:sldId id="280" r:id="rId25"/>
+    <p:sldId id="281" r:id="rId26"/>
+    <p:sldId id="282" r:id="rId27"/>
+    <p:sldId id="283" r:id="rId28"/>
+    <p:sldId id="284" r:id="rId29"/>
+    <p:sldId id="285" r:id="rId30"/>
+    <p:sldId id="286" r:id="rId31"/>
+    <p:sldId id="287" r:id="rId32"/>
+    <p:sldId id="288" r:id="rId33"/>
+    <p:sldId id="289" r:id="rId34"/>
+    <p:sldId id="306" r:id="rId35"/>
+    <p:sldId id="307" r:id="rId36"/>
+    <p:sldId id="308" r:id="rId37"/>
+    <p:sldId id="309" r:id="rId38"/>
+    <p:sldId id="310" r:id="rId39"/>
+    <p:sldId id="311" r:id="rId40"/>
+    <p:sldId id="321" r:id="rId41"/>
+    <p:sldId id="322" r:id="rId42"/>
+    <p:sldId id="323" r:id="rId43"/>
+    <p:sldId id="324" r:id="rId44"/>
+    <p:sldId id="325" r:id="rId45"/>
+    <p:sldId id="331" r:id="rId46"/>
+    <p:sldId id="332" r:id="rId47"/>
+    <p:sldId id="333" r:id="rId48"/>
+    <p:sldId id="334" r:id="rId49"/>
+    <p:sldId id="335" r:id="rId50"/>
+    <p:sldId id="317" r:id="rId51"/>
+    <p:sldId id="312" r:id="rId52"/>
+    <p:sldId id="313" r:id="rId53"/>
+    <p:sldId id="314" r:id="rId54"/>
+    <p:sldId id="315" r:id="rId55"/>
+    <p:sldId id="318" r:id="rId56"/>
+    <p:sldId id="319" r:id="rId57"/>
+    <p:sldId id="320" r:id="rId58"/>
+    <p:sldId id="305" r:id="rId59"/>
+    <p:sldId id="290" r:id="rId60"/>
+    <p:sldId id="291" r:id="rId61"/>
+    <p:sldId id="292" r:id="rId62"/>
+    <p:sldId id="293" r:id="rId63"/>
   </p:sldIdLst>
   <p:sldSz cx="12192000" cy="6858000"/>
   <p:notesSz cx="6858000" cy="9144000"/>
@@ -277,7 +320,7 @@
           <a:p>
             <a:fld id="{2F142BB3-9F87-4F32-99CE-4A0033E6A1B6}" type="datetimeFigureOut">
               <a:rPr lang="de-DE" smtClean="0"/>
-              <a:t>17.12.2018</a:t>
+              <a:t>18.12.2018</a:t>
             </a:fld>
             <a:endParaRPr lang="de-DE"/>
           </a:p>
@@ -475,7 +518,7 @@
           <a:p>
             <a:fld id="{2F142BB3-9F87-4F32-99CE-4A0033E6A1B6}" type="datetimeFigureOut">
               <a:rPr lang="de-DE" smtClean="0"/>
-              <a:t>17.12.2018</a:t>
+              <a:t>18.12.2018</a:t>
             </a:fld>
             <a:endParaRPr lang="de-DE"/>
           </a:p>
@@ -683,7 +726,7 @@
           <a:p>
             <a:fld id="{2F142BB3-9F87-4F32-99CE-4A0033E6A1B6}" type="datetimeFigureOut">
               <a:rPr lang="de-DE" smtClean="0"/>
-              <a:t>17.12.2018</a:t>
+              <a:t>18.12.2018</a:t>
             </a:fld>
             <a:endParaRPr lang="de-DE"/>
           </a:p>
@@ -881,7 +924,7 @@
           <a:p>
             <a:fld id="{2F142BB3-9F87-4F32-99CE-4A0033E6A1B6}" type="datetimeFigureOut">
               <a:rPr lang="de-DE" smtClean="0"/>
-              <a:t>17.12.2018</a:t>
+              <a:t>18.12.2018</a:t>
             </a:fld>
             <a:endParaRPr lang="de-DE"/>
           </a:p>
@@ -1156,7 +1199,7 @@
           <a:p>
             <a:fld id="{2F142BB3-9F87-4F32-99CE-4A0033E6A1B6}" type="datetimeFigureOut">
               <a:rPr lang="de-DE" smtClean="0"/>
-              <a:t>17.12.2018</a:t>
+              <a:t>18.12.2018</a:t>
             </a:fld>
             <a:endParaRPr lang="de-DE"/>
           </a:p>
@@ -1421,7 +1464,7 @@
           <a:p>
             <a:fld id="{2F142BB3-9F87-4F32-99CE-4A0033E6A1B6}" type="datetimeFigureOut">
               <a:rPr lang="de-DE" smtClean="0"/>
-              <a:t>17.12.2018</a:t>
+              <a:t>18.12.2018</a:t>
             </a:fld>
             <a:endParaRPr lang="de-DE"/>
           </a:p>
@@ -1833,7 +1876,7 @@
           <a:p>
             <a:fld id="{2F142BB3-9F87-4F32-99CE-4A0033E6A1B6}" type="datetimeFigureOut">
               <a:rPr lang="de-DE" smtClean="0"/>
-              <a:t>17.12.2018</a:t>
+              <a:t>18.12.2018</a:t>
             </a:fld>
             <a:endParaRPr lang="de-DE"/>
           </a:p>
@@ -1974,7 +2017,7 @@
           <a:p>
             <a:fld id="{2F142BB3-9F87-4F32-99CE-4A0033E6A1B6}" type="datetimeFigureOut">
               <a:rPr lang="de-DE" smtClean="0"/>
-              <a:t>17.12.2018</a:t>
+              <a:t>18.12.2018</a:t>
             </a:fld>
             <a:endParaRPr lang="de-DE"/>
           </a:p>
@@ -2087,7 +2130,7 @@
           <a:p>
             <a:fld id="{2F142BB3-9F87-4F32-99CE-4A0033E6A1B6}" type="datetimeFigureOut">
               <a:rPr lang="de-DE" smtClean="0"/>
-              <a:t>17.12.2018</a:t>
+              <a:t>18.12.2018</a:t>
             </a:fld>
             <a:endParaRPr lang="de-DE"/>
           </a:p>
@@ -2398,7 +2441,7 @@
           <a:p>
             <a:fld id="{2F142BB3-9F87-4F32-99CE-4A0033E6A1B6}" type="datetimeFigureOut">
               <a:rPr lang="de-DE" smtClean="0"/>
-              <a:t>17.12.2018</a:t>
+              <a:t>18.12.2018</a:t>
             </a:fld>
             <a:endParaRPr lang="de-DE"/>
           </a:p>
@@ -2686,7 +2729,7 @@
           <a:p>
             <a:fld id="{2F142BB3-9F87-4F32-99CE-4A0033E6A1B6}" type="datetimeFigureOut">
               <a:rPr lang="de-DE" smtClean="0"/>
-              <a:t>17.12.2018</a:t>
+              <a:t>18.12.2018</a:t>
             </a:fld>
             <a:endParaRPr lang="de-DE"/>
           </a:p>
@@ -2927,7 +2970,7 @@
           <a:p>
             <a:fld id="{2F142BB3-9F87-4F32-99CE-4A0033E6A1B6}" type="datetimeFigureOut">
               <a:rPr lang="de-DE" smtClean="0"/>
-              <a:t>17.12.2018</a:t>
+              <a:t>18.12.2018</a:t>
             </a:fld>
             <a:endParaRPr lang="de-DE"/>
           </a:p>
@@ -4248,6 +4291,666 @@
 </p:sld>
 </file>
 
+<file path=ppt/slides/slide20.xml><?xml version="1.0" encoding="utf-8"?>
+<p:sld xmlns:a="http://schemas.openxmlformats.org/drawingml/2006/main" xmlns:r="http://schemas.openxmlformats.org/officeDocument/2006/relationships" xmlns:p="http://schemas.openxmlformats.org/presentationml/2006/main">
+  <p:cSld>
+    <p:spTree>
+      <p:nvGrpSpPr>
+        <p:cNvPr id="1" name=""/>
+        <p:cNvGrpSpPr/>
+        <p:nvPr/>
+      </p:nvGrpSpPr>
+      <p:grpSpPr>
+        <a:xfrm>
+          <a:off x="0" y="0"/>
+          <a:ext cx="0" cy="0"/>
+          <a:chOff x="0" y="0"/>
+          <a:chExt cx="0" cy="0"/>
+        </a:xfrm>
+      </p:grpSpPr>
+      <p:pic>
+        <p:nvPicPr>
+          <p:cNvPr id="6" name="Grafik 5">
+            <a:extLst>
+              <a:ext uri="{FF2B5EF4-FFF2-40B4-BE49-F238E27FC236}">
+                <a16:creationId xmlns:a16="http://schemas.microsoft.com/office/drawing/2014/main" id="{90766673-93D3-4299-B0ED-A87E4DF7D47E}"/>
+              </a:ext>
+            </a:extLst>
+          </p:cNvPr>
+          <p:cNvPicPr>
+            <a:picLocks noChangeAspect="1"/>
+          </p:cNvPicPr>
+          <p:nvPr/>
+        </p:nvPicPr>
+        <p:blipFill>
+          <a:blip r:embed="rId2">
+            <a:extLst>
+              <a:ext uri="{28A0092B-C50C-407E-A947-70E740481C1C}">
+                <a14:useLocalDpi xmlns:a14="http://schemas.microsoft.com/office/drawing/2010/main" val="0"/>
+              </a:ext>
+            </a:extLst>
+          </a:blip>
+          <a:stretch>
+            <a:fillRect/>
+          </a:stretch>
+        </p:blipFill>
+        <p:spPr>
+          <a:xfrm>
+            <a:off x="730582" y="306000"/>
+            <a:ext cx="10730835" cy="6552000"/>
+          </a:xfrm>
+          <a:prstGeom prst="rect">
+            <a:avLst/>
+          </a:prstGeom>
+        </p:spPr>
+      </p:pic>
+    </p:spTree>
+    <p:extLst>
+      <p:ext uri="{BB962C8B-B14F-4D97-AF65-F5344CB8AC3E}">
+        <p14:creationId xmlns:p14="http://schemas.microsoft.com/office/powerpoint/2010/main" val="1921487758"/>
+      </p:ext>
+    </p:extLst>
+  </p:cSld>
+  <p:clrMapOvr>
+    <a:masterClrMapping/>
+  </p:clrMapOvr>
+</p:sld>
+</file>
+
+<file path=ppt/slides/slide21.xml><?xml version="1.0" encoding="utf-8"?>
+<p:sld xmlns:a="http://schemas.openxmlformats.org/drawingml/2006/main" xmlns:r="http://schemas.openxmlformats.org/officeDocument/2006/relationships" xmlns:p="http://schemas.openxmlformats.org/presentationml/2006/main">
+  <p:cSld>
+    <p:spTree>
+      <p:nvGrpSpPr>
+        <p:cNvPr id="1" name=""/>
+        <p:cNvGrpSpPr/>
+        <p:nvPr/>
+      </p:nvGrpSpPr>
+      <p:grpSpPr>
+        <a:xfrm>
+          <a:off x="0" y="0"/>
+          <a:ext cx="0" cy="0"/>
+          <a:chOff x="0" y="0"/>
+          <a:chExt cx="0" cy="0"/>
+        </a:xfrm>
+      </p:grpSpPr>
+      <p:pic>
+        <p:nvPicPr>
+          <p:cNvPr id="3" name="Grafik 2">
+            <a:extLst>
+              <a:ext uri="{FF2B5EF4-FFF2-40B4-BE49-F238E27FC236}">
+                <a16:creationId xmlns:a16="http://schemas.microsoft.com/office/drawing/2014/main" id="{502AE3CC-A56F-4D4E-BF68-CBE428D25D58}"/>
+              </a:ext>
+            </a:extLst>
+          </p:cNvPr>
+          <p:cNvPicPr>
+            <a:picLocks noChangeAspect="1"/>
+          </p:cNvPicPr>
+          <p:nvPr/>
+        </p:nvPicPr>
+        <p:blipFill>
+          <a:blip r:embed="rId2">
+            <a:extLst>
+              <a:ext uri="{28A0092B-C50C-407E-A947-70E740481C1C}">
+                <a14:useLocalDpi xmlns:a14="http://schemas.microsoft.com/office/drawing/2010/main" val="0"/>
+              </a:ext>
+            </a:extLst>
+          </a:blip>
+          <a:stretch>
+            <a:fillRect/>
+          </a:stretch>
+        </p:blipFill>
+        <p:spPr>
+          <a:xfrm>
+            <a:off x="730582" y="306000"/>
+            <a:ext cx="10730835" cy="6552000"/>
+          </a:xfrm>
+          <a:prstGeom prst="rect">
+            <a:avLst/>
+          </a:prstGeom>
+        </p:spPr>
+      </p:pic>
+    </p:spTree>
+    <p:extLst>
+      <p:ext uri="{BB962C8B-B14F-4D97-AF65-F5344CB8AC3E}">
+        <p14:creationId xmlns:p14="http://schemas.microsoft.com/office/powerpoint/2010/main" val="1433811481"/>
+      </p:ext>
+    </p:extLst>
+  </p:cSld>
+  <p:clrMapOvr>
+    <a:masterClrMapping/>
+  </p:clrMapOvr>
+</p:sld>
+</file>
+
+<file path=ppt/slides/slide22.xml><?xml version="1.0" encoding="utf-8"?>
+<p:sld xmlns:a="http://schemas.openxmlformats.org/drawingml/2006/main" xmlns:r="http://schemas.openxmlformats.org/officeDocument/2006/relationships" xmlns:p="http://schemas.openxmlformats.org/presentationml/2006/main">
+  <p:cSld>
+    <p:spTree>
+      <p:nvGrpSpPr>
+        <p:cNvPr id="1" name=""/>
+        <p:cNvGrpSpPr/>
+        <p:nvPr/>
+      </p:nvGrpSpPr>
+      <p:grpSpPr>
+        <a:xfrm>
+          <a:off x="0" y="0"/>
+          <a:ext cx="0" cy="0"/>
+          <a:chOff x="0" y="0"/>
+          <a:chExt cx="0" cy="0"/>
+        </a:xfrm>
+      </p:grpSpPr>
+      <p:pic>
+        <p:nvPicPr>
+          <p:cNvPr id="3" name="Grafik 2">
+            <a:extLst>
+              <a:ext uri="{FF2B5EF4-FFF2-40B4-BE49-F238E27FC236}">
+                <a16:creationId xmlns:a16="http://schemas.microsoft.com/office/drawing/2014/main" id="{01F19408-53B3-4497-AEBF-1CDA8E55236C}"/>
+              </a:ext>
+            </a:extLst>
+          </p:cNvPr>
+          <p:cNvPicPr>
+            <a:picLocks noChangeAspect="1"/>
+          </p:cNvPicPr>
+          <p:nvPr/>
+        </p:nvPicPr>
+        <p:blipFill>
+          <a:blip r:embed="rId2">
+            <a:extLst>
+              <a:ext uri="{28A0092B-C50C-407E-A947-70E740481C1C}">
+                <a14:useLocalDpi xmlns:a14="http://schemas.microsoft.com/office/drawing/2010/main" val="0"/>
+              </a:ext>
+            </a:extLst>
+          </a:blip>
+          <a:stretch>
+            <a:fillRect/>
+          </a:stretch>
+        </p:blipFill>
+        <p:spPr>
+          <a:xfrm>
+            <a:off x="730582" y="306000"/>
+            <a:ext cx="10730835" cy="6552000"/>
+          </a:xfrm>
+          <a:prstGeom prst="rect">
+            <a:avLst/>
+          </a:prstGeom>
+        </p:spPr>
+      </p:pic>
+    </p:spTree>
+    <p:extLst>
+      <p:ext uri="{BB962C8B-B14F-4D97-AF65-F5344CB8AC3E}">
+        <p14:creationId xmlns:p14="http://schemas.microsoft.com/office/powerpoint/2010/main" val="713319763"/>
+      </p:ext>
+    </p:extLst>
+  </p:cSld>
+  <p:clrMapOvr>
+    <a:masterClrMapping/>
+  </p:clrMapOvr>
+</p:sld>
+</file>
+
+<file path=ppt/slides/slide23.xml><?xml version="1.0" encoding="utf-8"?>
+<p:sld xmlns:a="http://schemas.openxmlformats.org/drawingml/2006/main" xmlns:r="http://schemas.openxmlformats.org/officeDocument/2006/relationships" xmlns:p="http://schemas.openxmlformats.org/presentationml/2006/main">
+  <p:cSld>
+    <p:spTree>
+      <p:nvGrpSpPr>
+        <p:cNvPr id="1" name=""/>
+        <p:cNvGrpSpPr/>
+        <p:nvPr/>
+      </p:nvGrpSpPr>
+      <p:grpSpPr>
+        <a:xfrm>
+          <a:off x="0" y="0"/>
+          <a:ext cx="0" cy="0"/>
+          <a:chOff x="0" y="0"/>
+          <a:chExt cx="0" cy="0"/>
+        </a:xfrm>
+      </p:grpSpPr>
+      <p:pic>
+        <p:nvPicPr>
+          <p:cNvPr id="3" name="Grafik 2">
+            <a:extLst>
+              <a:ext uri="{FF2B5EF4-FFF2-40B4-BE49-F238E27FC236}">
+                <a16:creationId xmlns:a16="http://schemas.microsoft.com/office/drawing/2014/main" id="{667305B3-1515-4AC9-9DBA-0694D298AB59}"/>
+              </a:ext>
+            </a:extLst>
+          </p:cNvPr>
+          <p:cNvPicPr>
+            <a:picLocks noChangeAspect="1"/>
+          </p:cNvPicPr>
+          <p:nvPr/>
+        </p:nvPicPr>
+        <p:blipFill>
+          <a:blip r:embed="rId2">
+            <a:extLst>
+              <a:ext uri="{28A0092B-C50C-407E-A947-70E740481C1C}">
+                <a14:useLocalDpi xmlns:a14="http://schemas.microsoft.com/office/drawing/2010/main" val="0"/>
+              </a:ext>
+            </a:extLst>
+          </a:blip>
+          <a:stretch>
+            <a:fillRect/>
+          </a:stretch>
+        </p:blipFill>
+        <p:spPr>
+          <a:xfrm>
+            <a:off x="730582" y="306000"/>
+            <a:ext cx="10730835" cy="6552000"/>
+          </a:xfrm>
+          <a:prstGeom prst="rect">
+            <a:avLst/>
+          </a:prstGeom>
+        </p:spPr>
+      </p:pic>
+    </p:spTree>
+    <p:extLst>
+      <p:ext uri="{BB962C8B-B14F-4D97-AF65-F5344CB8AC3E}">
+        <p14:creationId xmlns:p14="http://schemas.microsoft.com/office/powerpoint/2010/main" val="416377263"/>
+      </p:ext>
+    </p:extLst>
+  </p:cSld>
+  <p:clrMapOvr>
+    <a:masterClrMapping/>
+  </p:clrMapOvr>
+</p:sld>
+</file>
+
+<file path=ppt/slides/slide24.xml><?xml version="1.0" encoding="utf-8"?>
+<p:sld xmlns:a="http://schemas.openxmlformats.org/drawingml/2006/main" xmlns:r="http://schemas.openxmlformats.org/officeDocument/2006/relationships" xmlns:p="http://schemas.openxmlformats.org/presentationml/2006/main">
+  <p:cSld>
+    <p:spTree>
+      <p:nvGrpSpPr>
+        <p:cNvPr id="1" name=""/>
+        <p:cNvGrpSpPr/>
+        <p:nvPr/>
+      </p:nvGrpSpPr>
+      <p:grpSpPr>
+        <a:xfrm>
+          <a:off x="0" y="0"/>
+          <a:ext cx="0" cy="0"/>
+          <a:chOff x="0" y="0"/>
+          <a:chExt cx="0" cy="0"/>
+        </a:xfrm>
+      </p:grpSpPr>
+      <p:pic>
+        <p:nvPicPr>
+          <p:cNvPr id="3" name="Grafik 2">
+            <a:extLst>
+              <a:ext uri="{FF2B5EF4-FFF2-40B4-BE49-F238E27FC236}">
+                <a16:creationId xmlns:a16="http://schemas.microsoft.com/office/drawing/2014/main" id="{68BD947D-F9A0-4C26-A88C-C95C561F7241}"/>
+              </a:ext>
+            </a:extLst>
+          </p:cNvPr>
+          <p:cNvPicPr>
+            <a:picLocks noChangeAspect="1"/>
+          </p:cNvPicPr>
+          <p:nvPr/>
+        </p:nvPicPr>
+        <p:blipFill>
+          <a:blip r:embed="rId2">
+            <a:extLst>
+              <a:ext uri="{28A0092B-C50C-407E-A947-70E740481C1C}">
+                <a14:useLocalDpi xmlns:a14="http://schemas.microsoft.com/office/drawing/2010/main" val="0"/>
+              </a:ext>
+            </a:extLst>
+          </a:blip>
+          <a:stretch>
+            <a:fillRect/>
+          </a:stretch>
+        </p:blipFill>
+        <p:spPr>
+          <a:xfrm>
+            <a:off x="730582" y="306000"/>
+            <a:ext cx="10730835" cy="6552000"/>
+          </a:xfrm>
+          <a:prstGeom prst="rect">
+            <a:avLst/>
+          </a:prstGeom>
+        </p:spPr>
+      </p:pic>
+    </p:spTree>
+    <p:extLst>
+      <p:ext uri="{BB962C8B-B14F-4D97-AF65-F5344CB8AC3E}">
+        <p14:creationId xmlns:p14="http://schemas.microsoft.com/office/powerpoint/2010/main" val="3682125448"/>
+      </p:ext>
+    </p:extLst>
+  </p:cSld>
+  <p:clrMapOvr>
+    <a:masterClrMapping/>
+  </p:clrMapOvr>
+</p:sld>
+</file>
+
+<file path=ppt/slides/slide25.xml><?xml version="1.0" encoding="utf-8"?>
+<p:sld xmlns:a="http://schemas.openxmlformats.org/drawingml/2006/main" xmlns:r="http://schemas.openxmlformats.org/officeDocument/2006/relationships" xmlns:p="http://schemas.openxmlformats.org/presentationml/2006/main">
+  <p:cSld>
+    <p:spTree>
+      <p:nvGrpSpPr>
+        <p:cNvPr id="1" name=""/>
+        <p:cNvGrpSpPr/>
+        <p:nvPr/>
+      </p:nvGrpSpPr>
+      <p:grpSpPr>
+        <a:xfrm>
+          <a:off x="0" y="0"/>
+          <a:ext cx="0" cy="0"/>
+          <a:chOff x="0" y="0"/>
+          <a:chExt cx="0" cy="0"/>
+        </a:xfrm>
+      </p:grpSpPr>
+      <p:pic>
+        <p:nvPicPr>
+          <p:cNvPr id="3" name="Grafik 2">
+            <a:extLst>
+              <a:ext uri="{FF2B5EF4-FFF2-40B4-BE49-F238E27FC236}">
+                <a16:creationId xmlns:a16="http://schemas.microsoft.com/office/drawing/2014/main" id="{EC78A930-6D3B-4635-B2AD-1B6CEE5AA539}"/>
+              </a:ext>
+            </a:extLst>
+          </p:cNvPr>
+          <p:cNvPicPr>
+            <a:picLocks noChangeAspect="1"/>
+          </p:cNvPicPr>
+          <p:nvPr/>
+        </p:nvPicPr>
+        <p:blipFill>
+          <a:blip r:embed="rId2">
+            <a:extLst>
+              <a:ext uri="{28A0092B-C50C-407E-A947-70E740481C1C}">
+                <a14:useLocalDpi xmlns:a14="http://schemas.microsoft.com/office/drawing/2010/main" val="0"/>
+              </a:ext>
+            </a:extLst>
+          </a:blip>
+          <a:stretch>
+            <a:fillRect/>
+          </a:stretch>
+        </p:blipFill>
+        <p:spPr>
+          <a:xfrm>
+            <a:off x="730582" y="306000"/>
+            <a:ext cx="10730835" cy="6552000"/>
+          </a:xfrm>
+          <a:prstGeom prst="rect">
+            <a:avLst/>
+          </a:prstGeom>
+        </p:spPr>
+      </p:pic>
+    </p:spTree>
+    <p:extLst>
+      <p:ext uri="{BB962C8B-B14F-4D97-AF65-F5344CB8AC3E}">
+        <p14:creationId xmlns:p14="http://schemas.microsoft.com/office/powerpoint/2010/main" val="2075617833"/>
+      </p:ext>
+    </p:extLst>
+  </p:cSld>
+  <p:clrMapOvr>
+    <a:masterClrMapping/>
+  </p:clrMapOvr>
+</p:sld>
+</file>
+
+<file path=ppt/slides/slide26.xml><?xml version="1.0" encoding="utf-8"?>
+<p:sld xmlns:a="http://schemas.openxmlformats.org/drawingml/2006/main" xmlns:r="http://schemas.openxmlformats.org/officeDocument/2006/relationships" xmlns:p="http://schemas.openxmlformats.org/presentationml/2006/main">
+  <p:cSld>
+    <p:spTree>
+      <p:nvGrpSpPr>
+        <p:cNvPr id="1" name=""/>
+        <p:cNvGrpSpPr/>
+        <p:nvPr/>
+      </p:nvGrpSpPr>
+      <p:grpSpPr>
+        <a:xfrm>
+          <a:off x="0" y="0"/>
+          <a:ext cx="0" cy="0"/>
+          <a:chOff x="0" y="0"/>
+          <a:chExt cx="0" cy="0"/>
+        </a:xfrm>
+      </p:grpSpPr>
+      <p:pic>
+        <p:nvPicPr>
+          <p:cNvPr id="3" name="Grafik 2">
+            <a:extLst>
+              <a:ext uri="{FF2B5EF4-FFF2-40B4-BE49-F238E27FC236}">
+                <a16:creationId xmlns:a16="http://schemas.microsoft.com/office/drawing/2014/main" id="{CE183081-8D9D-473B-B044-EA7BD7D521E1}"/>
+              </a:ext>
+            </a:extLst>
+          </p:cNvPr>
+          <p:cNvPicPr>
+            <a:picLocks noChangeAspect="1"/>
+          </p:cNvPicPr>
+          <p:nvPr/>
+        </p:nvPicPr>
+        <p:blipFill>
+          <a:blip r:embed="rId2">
+            <a:extLst>
+              <a:ext uri="{28A0092B-C50C-407E-A947-70E740481C1C}">
+                <a14:useLocalDpi xmlns:a14="http://schemas.microsoft.com/office/drawing/2010/main" val="0"/>
+              </a:ext>
+            </a:extLst>
+          </a:blip>
+          <a:stretch>
+            <a:fillRect/>
+          </a:stretch>
+        </p:blipFill>
+        <p:spPr>
+          <a:xfrm>
+            <a:off x="730582" y="306000"/>
+            <a:ext cx="10730835" cy="6552000"/>
+          </a:xfrm>
+          <a:prstGeom prst="rect">
+            <a:avLst/>
+          </a:prstGeom>
+        </p:spPr>
+      </p:pic>
+    </p:spTree>
+    <p:extLst>
+      <p:ext uri="{BB962C8B-B14F-4D97-AF65-F5344CB8AC3E}">
+        <p14:creationId xmlns:p14="http://schemas.microsoft.com/office/powerpoint/2010/main" val="916425364"/>
+      </p:ext>
+    </p:extLst>
+  </p:cSld>
+  <p:clrMapOvr>
+    <a:masterClrMapping/>
+  </p:clrMapOvr>
+</p:sld>
+</file>
+
+<file path=ppt/slides/slide27.xml><?xml version="1.0" encoding="utf-8"?>
+<p:sld xmlns:a="http://schemas.openxmlformats.org/drawingml/2006/main" xmlns:r="http://schemas.openxmlformats.org/officeDocument/2006/relationships" xmlns:p="http://schemas.openxmlformats.org/presentationml/2006/main">
+  <p:cSld>
+    <p:spTree>
+      <p:nvGrpSpPr>
+        <p:cNvPr id="1" name=""/>
+        <p:cNvGrpSpPr/>
+        <p:nvPr/>
+      </p:nvGrpSpPr>
+      <p:grpSpPr>
+        <a:xfrm>
+          <a:off x="0" y="0"/>
+          <a:ext cx="0" cy="0"/>
+          <a:chOff x="0" y="0"/>
+          <a:chExt cx="0" cy="0"/>
+        </a:xfrm>
+      </p:grpSpPr>
+      <p:pic>
+        <p:nvPicPr>
+          <p:cNvPr id="3" name="Grafik 2">
+            <a:extLst>
+              <a:ext uri="{FF2B5EF4-FFF2-40B4-BE49-F238E27FC236}">
+                <a16:creationId xmlns:a16="http://schemas.microsoft.com/office/drawing/2014/main" id="{3C1339F4-AE7A-4206-A0F8-17C8125258DF}"/>
+              </a:ext>
+            </a:extLst>
+          </p:cNvPr>
+          <p:cNvPicPr>
+            <a:picLocks noChangeAspect="1"/>
+          </p:cNvPicPr>
+          <p:nvPr/>
+        </p:nvPicPr>
+        <p:blipFill>
+          <a:blip r:embed="rId2">
+            <a:extLst>
+              <a:ext uri="{28A0092B-C50C-407E-A947-70E740481C1C}">
+                <a14:useLocalDpi xmlns:a14="http://schemas.microsoft.com/office/drawing/2010/main" val="0"/>
+              </a:ext>
+            </a:extLst>
+          </a:blip>
+          <a:stretch>
+            <a:fillRect/>
+          </a:stretch>
+        </p:blipFill>
+        <p:spPr>
+          <a:xfrm>
+            <a:off x="730582" y="306000"/>
+            <a:ext cx="10730835" cy="6552000"/>
+          </a:xfrm>
+          <a:prstGeom prst="rect">
+            <a:avLst/>
+          </a:prstGeom>
+        </p:spPr>
+      </p:pic>
+    </p:spTree>
+    <p:extLst>
+      <p:ext uri="{BB962C8B-B14F-4D97-AF65-F5344CB8AC3E}">
+        <p14:creationId xmlns:p14="http://schemas.microsoft.com/office/powerpoint/2010/main" val="22193534"/>
+      </p:ext>
+    </p:extLst>
+  </p:cSld>
+  <p:clrMapOvr>
+    <a:masterClrMapping/>
+  </p:clrMapOvr>
+</p:sld>
+</file>
+
+<file path=ppt/slides/slide28.xml><?xml version="1.0" encoding="utf-8"?>
+<p:sld xmlns:a="http://schemas.openxmlformats.org/drawingml/2006/main" xmlns:r="http://schemas.openxmlformats.org/officeDocument/2006/relationships" xmlns:p="http://schemas.openxmlformats.org/presentationml/2006/main">
+  <p:cSld>
+    <p:spTree>
+      <p:nvGrpSpPr>
+        <p:cNvPr id="1" name=""/>
+        <p:cNvGrpSpPr/>
+        <p:nvPr/>
+      </p:nvGrpSpPr>
+      <p:grpSpPr>
+        <a:xfrm>
+          <a:off x="0" y="0"/>
+          <a:ext cx="0" cy="0"/>
+          <a:chOff x="0" y="0"/>
+          <a:chExt cx="0" cy="0"/>
+        </a:xfrm>
+      </p:grpSpPr>
+      <p:pic>
+        <p:nvPicPr>
+          <p:cNvPr id="3" name="Grafik 2">
+            <a:extLst>
+              <a:ext uri="{FF2B5EF4-FFF2-40B4-BE49-F238E27FC236}">
+                <a16:creationId xmlns:a16="http://schemas.microsoft.com/office/drawing/2014/main" id="{C04A14DA-F6D0-4EDE-99D1-58C21FC8B0C4}"/>
+              </a:ext>
+            </a:extLst>
+          </p:cNvPr>
+          <p:cNvPicPr>
+            <a:picLocks noChangeAspect="1"/>
+          </p:cNvPicPr>
+          <p:nvPr/>
+        </p:nvPicPr>
+        <p:blipFill>
+          <a:blip r:embed="rId2">
+            <a:extLst>
+              <a:ext uri="{28A0092B-C50C-407E-A947-70E740481C1C}">
+                <a14:useLocalDpi xmlns:a14="http://schemas.microsoft.com/office/drawing/2010/main" val="0"/>
+              </a:ext>
+            </a:extLst>
+          </a:blip>
+          <a:stretch>
+            <a:fillRect/>
+          </a:stretch>
+        </p:blipFill>
+        <p:spPr>
+          <a:xfrm>
+            <a:off x="730582" y="306000"/>
+            <a:ext cx="10730835" cy="6552000"/>
+          </a:xfrm>
+          <a:prstGeom prst="rect">
+            <a:avLst/>
+          </a:prstGeom>
+        </p:spPr>
+      </p:pic>
+    </p:spTree>
+    <p:extLst>
+      <p:ext uri="{BB962C8B-B14F-4D97-AF65-F5344CB8AC3E}">
+        <p14:creationId xmlns:p14="http://schemas.microsoft.com/office/powerpoint/2010/main" val="1879504982"/>
+      </p:ext>
+    </p:extLst>
+  </p:cSld>
+  <p:clrMapOvr>
+    <a:masterClrMapping/>
+  </p:clrMapOvr>
+</p:sld>
+</file>
+
+<file path=ppt/slides/slide29.xml><?xml version="1.0" encoding="utf-8"?>
+<p:sld xmlns:a="http://schemas.openxmlformats.org/drawingml/2006/main" xmlns:r="http://schemas.openxmlformats.org/officeDocument/2006/relationships" xmlns:p="http://schemas.openxmlformats.org/presentationml/2006/main">
+  <p:cSld>
+    <p:spTree>
+      <p:nvGrpSpPr>
+        <p:cNvPr id="1" name=""/>
+        <p:cNvGrpSpPr/>
+        <p:nvPr/>
+      </p:nvGrpSpPr>
+      <p:grpSpPr>
+        <a:xfrm>
+          <a:off x="0" y="0"/>
+          <a:ext cx="0" cy="0"/>
+          <a:chOff x="0" y="0"/>
+          <a:chExt cx="0" cy="0"/>
+        </a:xfrm>
+      </p:grpSpPr>
+      <p:pic>
+        <p:nvPicPr>
+          <p:cNvPr id="3" name="Grafik 2">
+            <a:extLst>
+              <a:ext uri="{FF2B5EF4-FFF2-40B4-BE49-F238E27FC236}">
+                <a16:creationId xmlns:a16="http://schemas.microsoft.com/office/drawing/2014/main" id="{A10346B5-E2D3-4562-AD59-E89EE4900F2A}"/>
+              </a:ext>
+            </a:extLst>
+          </p:cNvPr>
+          <p:cNvPicPr>
+            <a:picLocks noChangeAspect="1"/>
+          </p:cNvPicPr>
+          <p:nvPr/>
+        </p:nvPicPr>
+        <p:blipFill>
+          <a:blip r:embed="rId2">
+            <a:extLst>
+              <a:ext uri="{28A0092B-C50C-407E-A947-70E740481C1C}">
+                <a14:useLocalDpi xmlns:a14="http://schemas.microsoft.com/office/drawing/2010/main" val="0"/>
+              </a:ext>
+            </a:extLst>
+          </a:blip>
+          <a:stretch>
+            <a:fillRect/>
+          </a:stretch>
+        </p:blipFill>
+        <p:spPr>
+          <a:xfrm>
+            <a:off x="730582" y="306000"/>
+            <a:ext cx="10730835" cy="6552000"/>
+          </a:xfrm>
+          <a:prstGeom prst="rect">
+            <a:avLst/>
+          </a:prstGeom>
+        </p:spPr>
+      </p:pic>
+    </p:spTree>
+    <p:extLst>
+      <p:ext uri="{BB962C8B-B14F-4D97-AF65-F5344CB8AC3E}">
+        <p14:creationId xmlns:p14="http://schemas.microsoft.com/office/powerpoint/2010/main" val="2426122576"/>
+      </p:ext>
+    </p:extLst>
+  </p:cSld>
+  <p:clrMapOvr>
+    <a:masterClrMapping/>
+  </p:clrMapOvr>
+</p:sld>
+</file>
+
 <file path=ppt/slides/slide3.xml><?xml version="1.0" encoding="utf-8"?>
 <p:sld xmlns:a="http://schemas.openxmlformats.org/drawingml/2006/main" xmlns:r="http://schemas.openxmlformats.org/officeDocument/2006/relationships" xmlns:p="http://schemas.openxmlformats.org/presentationml/2006/main">
   <p:cSld>
@@ -4343,6 +5046,666 @@
     <p:extLst>
       <p:ext uri="{BB962C8B-B14F-4D97-AF65-F5344CB8AC3E}">
         <p14:creationId xmlns:p14="http://schemas.microsoft.com/office/powerpoint/2010/main" val="3373265405"/>
+      </p:ext>
+    </p:extLst>
+  </p:cSld>
+  <p:clrMapOvr>
+    <a:masterClrMapping/>
+  </p:clrMapOvr>
+</p:sld>
+</file>
+
+<file path=ppt/slides/slide30.xml><?xml version="1.0" encoding="utf-8"?>
+<p:sld xmlns:a="http://schemas.openxmlformats.org/drawingml/2006/main" xmlns:r="http://schemas.openxmlformats.org/officeDocument/2006/relationships" xmlns:p="http://schemas.openxmlformats.org/presentationml/2006/main">
+  <p:cSld>
+    <p:spTree>
+      <p:nvGrpSpPr>
+        <p:cNvPr id="1" name=""/>
+        <p:cNvGrpSpPr/>
+        <p:nvPr/>
+      </p:nvGrpSpPr>
+      <p:grpSpPr>
+        <a:xfrm>
+          <a:off x="0" y="0"/>
+          <a:ext cx="0" cy="0"/>
+          <a:chOff x="0" y="0"/>
+          <a:chExt cx="0" cy="0"/>
+        </a:xfrm>
+      </p:grpSpPr>
+      <p:pic>
+        <p:nvPicPr>
+          <p:cNvPr id="3" name="Grafik 2">
+            <a:extLst>
+              <a:ext uri="{FF2B5EF4-FFF2-40B4-BE49-F238E27FC236}">
+                <a16:creationId xmlns:a16="http://schemas.microsoft.com/office/drawing/2014/main" id="{E535035E-F151-4EFE-8D21-B0FBC04B74D3}"/>
+              </a:ext>
+            </a:extLst>
+          </p:cNvPr>
+          <p:cNvPicPr>
+            <a:picLocks noChangeAspect="1"/>
+          </p:cNvPicPr>
+          <p:nvPr/>
+        </p:nvPicPr>
+        <p:blipFill>
+          <a:blip r:embed="rId2">
+            <a:extLst>
+              <a:ext uri="{28A0092B-C50C-407E-A947-70E740481C1C}">
+                <a14:useLocalDpi xmlns:a14="http://schemas.microsoft.com/office/drawing/2010/main" val="0"/>
+              </a:ext>
+            </a:extLst>
+          </a:blip>
+          <a:stretch>
+            <a:fillRect/>
+          </a:stretch>
+        </p:blipFill>
+        <p:spPr>
+          <a:xfrm>
+            <a:off x="730582" y="306000"/>
+            <a:ext cx="10730835" cy="6552000"/>
+          </a:xfrm>
+          <a:prstGeom prst="rect">
+            <a:avLst/>
+          </a:prstGeom>
+        </p:spPr>
+      </p:pic>
+    </p:spTree>
+    <p:extLst>
+      <p:ext uri="{BB962C8B-B14F-4D97-AF65-F5344CB8AC3E}">
+        <p14:creationId xmlns:p14="http://schemas.microsoft.com/office/powerpoint/2010/main" val="3292931433"/>
+      </p:ext>
+    </p:extLst>
+  </p:cSld>
+  <p:clrMapOvr>
+    <a:masterClrMapping/>
+  </p:clrMapOvr>
+</p:sld>
+</file>
+
+<file path=ppt/slides/slide31.xml><?xml version="1.0" encoding="utf-8"?>
+<p:sld xmlns:a="http://schemas.openxmlformats.org/drawingml/2006/main" xmlns:r="http://schemas.openxmlformats.org/officeDocument/2006/relationships" xmlns:p="http://schemas.openxmlformats.org/presentationml/2006/main">
+  <p:cSld>
+    <p:spTree>
+      <p:nvGrpSpPr>
+        <p:cNvPr id="1" name=""/>
+        <p:cNvGrpSpPr/>
+        <p:nvPr/>
+      </p:nvGrpSpPr>
+      <p:grpSpPr>
+        <a:xfrm>
+          <a:off x="0" y="0"/>
+          <a:ext cx="0" cy="0"/>
+          <a:chOff x="0" y="0"/>
+          <a:chExt cx="0" cy="0"/>
+        </a:xfrm>
+      </p:grpSpPr>
+      <p:pic>
+        <p:nvPicPr>
+          <p:cNvPr id="3" name="Grafik 2">
+            <a:extLst>
+              <a:ext uri="{FF2B5EF4-FFF2-40B4-BE49-F238E27FC236}">
+                <a16:creationId xmlns:a16="http://schemas.microsoft.com/office/drawing/2014/main" id="{BD7748F8-CFF9-487A-B7C5-6F57DBC8AD38}"/>
+              </a:ext>
+            </a:extLst>
+          </p:cNvPr>
+          <p:cNvPicPr>
+            <a:picLocks noChangeAspect="1"/>
+          </p:cNvPicPr>
+          <p:nvPr/>
+        </p:nvPicPr>
+        <p:blipFill>
+          <a:blip r:embed="rId2">
+            <a:extLst>
+              <a:ext uri="{28A0092B-C50C-407E-A947-70E740481C1C}">
+                <a14:useLocalDpi xmlns:a14="http://schemas.microsoft.com/office/drawing/2010/main" val="0"/>
+              </a:ext>
+            </a:extLst>
+          </a:blip>
+          <a:stretch>
+            <a:fillRect/>
+          </a:stretch>
+        </p:blipFill>
+        <p:spPr>
+          <a:xfrm>
+            <a:off x="730582" y="306000"/>
+            <a:ext cx="10730835" cy="6552000"/>
+          </a:xfrm>
+          <a:prstGeom prst="rect">
+            <a:avLst/>
+          </a:prstGeom>
+        </p:spPr>
+      </p:pic>
+    </p:spTree>
+    <p:extLst>
+      <p:ext uri="{BB962C8B-B14F-4D97-AF65-F5344CB8AC3E}">
+        <p14:creationId xmlns:p14="http://schemas.microsoft.com/office/powerpoint/2010/main" val="3329553523"/>
+      </p:ext>
+    </p:extLst>
+  </p:cSld>
+  <p:clrMapOvr>
+    <a:masterClrMapping/>
+  </p:clrMapOvr>
+</p:sld>
+</file>
+
+<file path=ppt/slides/slide32.xml><?xml version="1.0" encoding="utf-8"?>
+<p:sld xmlns:a="http://schemas.openxmlformats.org/drawingml/2006/main" xmlns:r="http://schemas.openxmlformats.org/officeDocument/2006/relationships" xmlns:p="http://schemas.openxmlformats.org/presentationml/2006/main">
+  <p:cSld>
+    <p:spTree>
+      <p:nvGrpSpPr>
+        <p:cNvPr id="1" name=""/>
+        <p:cNvGrpSpPr/>
+        <p:nvPr/>
+      </p:nvGrpSpPr>
+      <p:grpSpPr>
+        <a:xfrm>
+          <a:off x="0" y="0"/>
+          <a:ext cx="0" cy="0"/>
+          <a:chOff x="0" y="0"/>
+          <a:chExt cx="0" cy="0"/>
+        </a:xfrm>
+      </p:grpSpPr>
+      <p:pic>
+        <p:nvPicPr>
+          <p:cNvPr id="3" name="Grafik 2">
+            <a:extLst>
+              <a:ext uri="{FF2B5EF4-FFF2-40B4-BE49-F238E27FC236}">
+                <a16:creationId xmlns:a16="http://schemas.microsoft.com/office/drawing/2014/main" id="{F0946E6F-879B-4536-B585-91E0323F7931}"/>
+              </a:ext>
+            </a:extLst>
+          </p:cNvPr>
+          <p:cNvPicPr>
+            <a:picLocks noChangeAspect="1"/>
+          </p:cNvPicPr>
+          <p:nvPr/>
+        </p:nvPicPr>
+        <p:blipFill>
+          <a:blip r:embed="rId2">
+            <a:extLst>
+              <a:ext uri="{28A0092B-C50C-407E-A947-70E740481C1C}">
+                <a14:useLocalDpi xmlns:a14="http://schemas.microsoft.com/office/drawing/2010/main" val="0"/>
+              </a:ext>
+            </a:extLst>
+          </a:blip>
+          <a:stretch>
+            <a:fillRect/>
+          </a:stretch>
+        </p:blipFill>
+        <p:spPr>
+          <a:xfrm>
+            <a:off x="730582" y="306000"/>
+            <a:ext cx="10730835" cy="6552000"/>
+          </a:xfrm>
+          <a:prstGeom prst="rect">
+            <a:avLst/>
+          </a:prstGeom>
+        </p:spPr>
+      </p:pic>
+    </p:spTree>
+    <p:extLst>
+      <p:ext uri="{BB962C8B-B14F-4D97-AF65-F5344CB8AC3E}">
+        <p14:creationId xmlns:p14="http://schemas.microsoft.com/office/powerpoint/2010/main" val="40063947"/>
+      </p:ext>
+    </p:extLst>
+  </p:cSld>
+  <p:clrMapOvr>
+    <a:masterClrMapping/>
+  </p:clrMapOvr>
+</p:sld>
+</file>
+
+<file path=ppt/slides/slide33.xml><?xml version="1.0" encoding="utf-8"?>
+<p:sld xmlns:a="http://schemas.openxmlformats.org/drawingml/2006/main" xmlns:r="http://schemas.openxmlformats.org/officeDocument/2006/relationships" xmlns:p="http://schemas.openxmlformats.org/presentationml/2006/main">
+  <p:cSld>
+    <p:spTree>
+      <p:nvGrpSpPr>
+        <p:cNvPr id="1" name=""/>
+        <p:cNvGrpSpPr/>
+        <p:nvPr/>
+      </p:nvGrpSpPr>
+      <p:grpSpPr>
+        <a:xfrm>
+          <a:off x="0" y="0"/>
+          <a:ext cx="0" cy="0"/>
+          <a:chOff x="0" y="0"/>
+          <a:chExt cx="0" cy="0"/>
+        </a:xfrm>
+      </p:grpSpPr>
+      <p:pic>
+        <p:nvPicPr>
+          <p:cNvPr id="3" name="Grafik 2">
+            <a:extLst>
+              <a:ext uri="{FF2B5EF4-FFF2-40B4-BE49-F238E27FC236}">
+                <a16:creationId xmlns:a16="http://schemas.microsoft.com/office/drawing/2014/main" id="{F1B69A1D-5013-480D-A5A9-CD05215DEFE3}"/>
+              </a:ext>
+            </a:extLst>
+          </p:cNvPr>
+          <p:cNvPicPr>
+            <a:picLocks noChangeAspect="1"/>
+          </p:cNvPicPr>
+          <p:nvPr/>
+        </p:nvPicPr>
+        <p:blipFill>
+          <a:blip r:embed="rId2">
+            <a:extLst>
+              <a:ext uri="{28A0092B-C50C-407E-A947-70E740481C1C}">
+                <a14:useLocalDpi xmlns:a14="http://schemas.microsoft.com/office/drawing/2010/main" val="0"/>
+              </a:ext>
+            </a:extLst>
+          </a:blip>
+          <a:stretch>
+            <a:fillRect/>
+          </a:stretch>
+        </p:blipFill>
+        <p:spPr>
+          <a:xfrm>
+            <a:off x="1261258" y="306000"/>
+            <a:ext cx="9669484" cy="6552000"/>
+          </a:xfrm>
+          <a:prstGeom prst="rect">
+            <a:avLst/>
+          </a:prstGeom>
+        </p:spPr>
+      </p:pic>
+    </p:spTree>
+    <p:extLst>
+      <p:ext uri="{BB962C8B-B14F-4D97-AF65-F5344CB8AC3E}">
+        <p14:creationId xmlns:p14="http://schemas.microsoft.com/office/powerpoint/2010/main" val="2530528545"/>
+      </p:ext>
+    </p:extLst>
+  </p:cSld>
+  <p:clrMapOvr>
+    <a:masterClrMapping/>
+  </p:clrMapOvr>
+</p:sld>
+</file>
+
+<file path=ppt/slides/slide34.xml><?xml version="1.0" encoding="utf-8"?>
+<p:sld xmlns:a="http://schemas.openxmlformats.org/drawingml/2006/main" xmlns:r="http://schemas.openxmlformats.org/officeDocument/2006/relationships" xmlns:p="http://schemas.openxmlformats.org/presentationml/2006/main">
+  <p:cSld>
+    <p:spTree>
+      <p:nvGrpSpPr>
+        <p:cNvPr id="1" name=""/>
+        <p:cNvGrpSpPr/>
+        <p:nvPr/>
+      </p:nvGrpSpPr>
+      <p:grpSpPr>
+        <a:xfrm>
+          <a:off x="0" y="0"/>
+          <a:ext cx="0" cy="0"/>
+          <a:chOff x="0" y="0"/>
+          <a:chExt cx="0" cy="0"/>
+        </a:xfrm>
+      </p:grpSpPr>
+      <p:pic>
+        <p:nvPicPr>
+          <p:cNvPr id="3" name="Grafik 2">
+            <a:extLst>
+              <a:ext uri="{FF2B5EF4-FFF2-40B4-BE49-F238E27FC236}">
+                <a16:creationId xmlns:a16="http://schemas.microsoft.com/office/drawing/2014/main" id="{74C14528-529D-4056-B1D2-467027CA2F5F}"/>
+              </a:ext>
+            </a:extLst>
+          </p:cNvPr>
+          <p:cNvPicPr>
+            <a:picLocks noChangeAspect="1"/>
+          </p:cNvPicPr>
+          <p:nvPr/>
+        </p:nvPicPr>
+        <p:blipFill>
+          <a:blip r:embed="rId2">
+            <a:extLst>
+              <a:ext uri="{28A0092B-C50C-407E-A947-70E740481C1C}">
+                <a14:useLocalDpi xmlns:a14="http://schemas.microsoft.com/office/drawing/2010/main" val="0"/>
+              </a:ext>
+            </a:extLst>
+          </a:blip>
+          <a:stretch>
+            <a:fillRect/>
+          </a:stretch>
+        </p:blipFill>
+        <p:spPr>
+          <a:xfrm>
+            <a:off x="1261258" y="306000"/>
+            <a:ext cx="9669484" cy="6552000"/>
+          </a:xfrm>
+          <a:prstGeom prst="rect">
+            <a:avLst/>
+          </a:prstGeom>
+        </p:spPr>
+      </p:pic>
+    </p:spTree>
+    <p:extLst>
+      <p:ext uri="{BB962C8B-B14F-4D97-AF65-F5344CB8AC3E}">
+        <p14:creationId xmlns:p14="http://schemas.microsoft.com/office/powerpoint/2010/main" val="139360424"/>
+      </p:ext>
+    </p:extLst>
+  </p:cSld>
+  <p:clrMapOvr>
+    <a:masterClrMapping/>
+  </p:clrMapOvr>
+</p:sld>
+</file>
+
+<file path=ppt/slides/slide35.xml><?xml version="1.0" encoding="utf-8"?>
+<p:sld xmlns:a="http://schemas.openxmlformats.org/drawingml/2006/main" xmlns:r="http://schemas.openxmlformats.org/officeDocument/2006/relationships" xmlns:p="http://schemas.openxmlformats.org/presentationml/2006/main">
+  <p:cSld>
+    <p:spTree>
+      <p:nvGrpSpPr>
+        <p:cNvPr id="1" name=""/>
+        <p:cNvGrpSpPr/>
+        <p:nvPr/>
+      </p:nvGrpSpPr>
+      <p:grpSpPr>
+        <a:xfrm>
+          <a:off x="0" y="0"/>
+          <a:ext cx="0" cy="0"/>
+          <a:chOff x="0" y="0"/>
+          <a:chExt cx="0" cy="0"/>
+        </a:xfrm>
+      </p:grpSpPr>
+      <p:pic>
+        <p:nvPicPr>
+          <p:cNvPr id="3" name="Grafik 2">
+            <a:extLst>
+              <a:ext uri="{FF2B5EF4-FFF2-40B4-BE49-F238E27FC236}">
+                <a16:creationId xmlns:a16="http://schemas.microsoft.com/office/drawing/2014/main" id="{24D52251-93B7-4C00-89EE-C0F7D0E673E5}"/>
+              </a:ext>
+            </a:extLst>
+          </p:cNvPr>
+          <p:cNvPicPr>
+            <a:picLocks noChangeAspect="1"/>
+          </p:cNvPicPr>
+          <p:nvPr/>
+        </p:nvPicPr>
+        <p:blipFill>
+          <a:blip r:embed="rId2">
+            <a:extLst>
+              <a:ext uri="{28A0092B-C50C-407E-A947-70E740481C1C}">
+                <a14:useLocalDpi xmlns:a14="http://schemas.microsoft.com/office/drawing/2010/main" val="0"/>
+              </a:ext>
+            </a:extLst>
+          </a:blip>
+          <a:stretch>
+            <a:fillRect/>
+          </a:stretch>
+        </p:blipFill>
+        <p:spPr>
+          <a:xfrm>
+            <a:off x="1261258" y="306000"/>
+            <a:ext cx="9669484" cy="6552000"/>
+          </a:xfrm>
+          <a:prstGeom prst="rect">
+            <a:avLst/>
+          </a:prstGeom>
+        </p:spPr>
+      </p:pic>
+    </p:spTree>
+    <p:extLst>
+      <p:ext uri="{BB962C8B-B14F-4D97-AF65-F5344CB8AC3E}">
+        <p14:creationId xmlns:p14="http://schemas.microsoft.com/office/powerpoint/2010/main" val="1339252522"/>
+      </p:ext>
+    </p:extLst>
+  </p:cSld>
+  <p:clrMapOvr>
+    <a:masterClrMapping/>
+  </p:clrMapOvr>
+</p:sld>
+</file>
+
+<file path=ppt/slides/slide36.xml><?xml version="1.0" encoding="utf-8"?>
+<p:sld xmlns:a="http://schemas.openxmlformats.org/drawingml/2006/main" xmlns:r="http://schemas.openxmlformats.org/officeDocument/2006/relationships" xmlns:p="http://schemas.openxmlformats.org/presentationml/2006/main">
+  <p:cSld>
+    <p:spTree>
+      <p:nvGrpSpPr>
+        <p:cNvPr id="1" name=""/>
+        <p:cNvGrpSpPr/>
+        <p:nvPr/>
+      </p:nvGrpSpPr>
+      <p:grpSpPr>
+        <a:xfrm>
+          <a:off x="0" y="0"/>
+          <a:ext cx="0" cy="0"/>
+          <a:chOff x="0" y="0"/>
+          <a:chExt cx="0" cy="0"/>
+        </a:xfrm>
+      </p:grpSpPr>
+      <p:pic>
+        <p:nvPicPr>
+          <p:cNvPr id="3" name="Grafik 2">
+            <a:extLst>
+              <a:ext uri="{FF2B5EF4-FFF2-40B4-BE49-F238E27FC236}">
+                <a16:creationId xmlns:a16="http://schemas.microsoft.com/office/drawing/2014/main" id="{CBB7FF95-0178-492D-A94D-D651307C5399}"/>
+              </a:ext>
+            </a:extLst>
+          </p:cNvPr>
+          <p:cNvPicPr>
+            <a:picLocks noChangeAspect="1"/>
+          </p:cNvPicPr>
+          <p:nvPr/>
+        </p:nvPicPr>
+        <p:blipFill>
+          <a:blip r:embed="rId2">
+            <a:extLst>
+              <a:ext uri="{28A0092B-C50C-407E-A947-70E740481C1C}">
+                <a14:useLocalDpi xmlns:a14="http://schemas.microsoft.com/office/drawing/2010/main" val="0"/>
+              </a:ext>
+            </a:extLst>
+          </a:blip>
+          <a:stretch>
+            <a:fillRect/>
+          </a:stretch>
+        </p:blipFill>
+        <p:spPr>
+          <a:xfrm>
+            <a:off x="1261258" y="306000"/>
+            <a:ext cx="9669484" cy="6552000"/>
+          </a:xfrm>
+          <a:prstGeom prst="rect">
+            <a:avLst/>
+          </a:prstGeom>
+        </p:spPr>
+      </p:pic>
+    </p:spTree>
+    <p:extLst>
+      <p:ext uri="{BB962C8B-B14F-4D97-AF65-F5344CB8AC3E}">
+        <p14:creationId xmlns:p14="http://schemas.microsoft.com/office/powerpoint/2010/main" val="2212243807"/>
+      </p:ext>
+    </p:extLst>
+  </p:cSld>
+  <p:clrMapOvr>
+    <a:masterClrMapping/>
+  </p:clrMapOvr>
+</p:sld>
+</file>
+
+<file path=ppt/slides/slide37.xml><?xml version="1.0" encoding="utf-8"?>
+<p:sld xmlns:a="http://schemas.openxmlformats.org/drawingml/2006/main" xmlns:r="http://schemas.openxmlformats.org/officeDocument/2006/relationships" xmlns:p="http://schemas.openxmlformats.org/presentationml/2006/main">
+  <p:cSld>
+    <p:spTree>
+      <p:nvGrpSpPr>
+        <p:cNvPr id="1" name=""/>
+        <p:cNvGrpSpPr/>
+        <p:nvPr/>
+      </p:nvGrpSpPr>
+      <p:grpSpPr>
+        <a:xfrm>
+          <a:off x="0" y="0"/>
+          <a:ext cx="0" cy="0"/>
+          <a:chOff x="0" y="0"/>
+          <a:chExt cx="0" cy="0"/>
+        </a:xfrm>
+      </p:grpSpPr>
+      <p:pic>
+        <p:nvPicPr>
+          <p:cNvPr id="3" name="Grafik 2">
+            <a:extLst>
+              <a:ext uri="{FF2B5EF4-FFF2-40B4-BE49-F238E27FC236}">
+                <a16:creationId xmlns:a16="http://schemas.microsoft.com/office/drawing/2014/main" id="{BFECDDF8-8257-41A0-9F73-9341228ACF8C}"/>
+              </a:ext>
+            </a:extLst>
+          </p:cNvPr>
+          <p:cNvPicPr>
+            <a:picLocks noChangeAspect="1"/>
+          </p:cNvPicPr>
+          <p:nvPr/>
+        </p:nvPicPr>
+        <p:blipFill>
+          <a:blip r:embed="rId2">
+            <a:extLst>
+              <a:ext uri="{28A0092B-C50C-407E-A947-70E740481C1C}">
+                <a14:useLocalDpi xmlns:a14="http://schemas.microsoft.com/office/drawing/2010/main" val="0"/>
+              </a:ext>
+            </a:extLst>
+          </a:blip>
+          <a:stretch>
+            <a:fillRect/>
+          </a:stretch>
+        </p:blipFill>
+        <p:spPr>
+          <a:xfrm>
+            <a:off x="1261258" y="306000"/>
+            <a:ext cx="9669484" cy="6552000"/>
+          </a:xfrm>
+          <a:prstGeom prst="rect">
+            <a:avLst/>
+          </a:prstGeom>
+        </p:spPr>
+      </p:pic>
+    </p:spTree>
+    <p:extLst>
+      <p:ext uri="{BB962C8B-B14F-4D97-AF65-F5344CB8AC3E}">
+        <p14:creationId xmlns:p14="http://schemas.microsoft.com/office/powerpoint/2010/main" val="1332327910"/>
+      </p:ext>
+    </p:extLst>
+  </p:cSld>
+  <p:clrMapOvr>
+    <a:masterClrMapping/>
+  </p:clrMapOvr>
+</p:sld>
+</file>
+
+<file path=ppt/slides/slide38.xml><?xml version="1.0" encoding="utf-8"?>
+<p:sld xmlns:a="http://schemas.openxmlformats.org/drawingml/2006/main" xmlns:r="http://schemas.openxmlformats.org/officeDocument/2006/relationships" xmlns:p="http://schemas.openxmlformats.org/presentationml/2006/main">
+  <p:cSld>
+    <p:spTree>
+      <p:nvGrpSpPr>
+        <p:cNvPr id="1" name=""/>
+        <p:cNvGrpSpPr/>
+        <p:nvPr/>
+      </p:nvGrpSpPr>
+      <p:grpSpPr>
+        <a:xfrm>
+          <a:off x="0" y="0"/>
+          <a:ext cx="0" cy="0"/>
+          <a:chOff x="0" y="0"/>
+          <a:chExt cx="0" cy="0"/>
+        </a:xfrm>
+      </p:grpSpPr>
+      <p:pic>
+        <p:nvPicPr>
+          <p:cNvPr id="3" name="Grafik 2">
+            <a:extLst>
+              <a:ext uri="{FF2B5EF4-FFF2-40B4-BE49-F238E27FC236}">
+                <a16:creationId xmlns:a16="http://schemas.microsoft.com/office/drawing/2014/main" id="{A21A8053-4DBB-4566-86D3-DF2046414998}"/>
+              </a:ext>
+            </a:extLst>
+          </p:cNvPr>
+          <p:cNvPicPr>
+            <a:picLocks noChangeAspect="1"/>
+          </p:cNvPicPr>
+          <p:nvPr/>
+        </p:nvPicPr>
+        <p:blipFill>
+          <a:blip r:embed="rId2">
+            <a:extLst>
+              <a:ext uri="{28A0092B-C50C-407E-A947-70E740481C1C}">
+                <a14:useLocalDpi xmlns:a14="http://schemas.microsoft.com/office/drawing/2010/main" val="0"/>
+              </a:ext>
+            </a:extLst>
+          </a:blip>
+          <a:stretch>
+            <a:fillRect/>
+          </a:stretch>
+        </p:blipFill>
+        <p:spPr>
+          <a:xfrm>
+            <a:off x="1261258" y="306000"/>
+            <a:ext cx="9669484" cy="6552000"/>
+          </a:xfrm>
+          <a:prstGeom prst="rect">
+            <a:avLst/>
+          </a:prstGeom>
+        </p:spPr>
+      </p:pic>
+    </p:spTree>
+    <p:extLst>
+      <p:ext uri="{BB962C8B-B14F-4D97-AF65-F5344CB8AC3E}">
+        <p14:creationId xmlns:p14="http://schemas.microsoft.com/office/powerpoint/2010/main" val="198664142"/>
+      </p:ext>
+    </p:extLst>
+  </p:cSld>
+  <p:clrMapOvr>
+    <a:masterClrMapping/>
+  </p:clrMapOvr>
+</p:sld>
+</file>
+
+<file path=ppt/slides/slide39.xml><?xml version="1.0" encoding="utf-8"?>
+<p:sld xmlns:a="http://schemas.openxmlformats.org/drawingml/2006/main" xmlns:r="http://schemas.openxmlformats.org/officeDocument/2006/relationships" xmlns:p="http://schemas.openxmlformats.org/presentationml/2006/main">
+  <p:cSld>
+    <p:spTree>
+      <p:nvGrpSpPr>
+        <p:cNvPr id="1" name=""/>
+        <p:cNvGrpSpPr/>
+        <p:nvPr/>
+      </p:nvGrpSpPr>
+      <p:grpSpPr>
+        <a:xfrm>
+          <a:off x="0" y="0"/>
+          <a:ext cx="0" cy="0"/>
+          <a:chOff x="0" y="0"/>
+          <a:chExt cx="0" cy="0"/>
+        </a:xfrm>
+      </p:grpSpPr>
+      <p:pic>
+        <p:nvPicPr>
+          <p:cNvPr id="3" name="Grafik 2">
+            <a:extLst>
+              <a:ext uri="{FF2B5EF4-FFF2-40B4-BE49-F238E27FC236}">
+                <a16:creationId xmlns:a16="http://schemas.microsoft.com/office/drawing/2014/main" id="{6795F879-C733-4561-B352-C93AFD0C6129}"/>
+              </a:ext>
+            </a:extLst>
+          </p:cNvPr>
+          <p:cNvPicPr>
+            <a:picLocks noChangeAspect="1"/>
+          </p:cNvPicPr>
+          <p:nvPr/>
+        </p:nvPicPr>
+        <p:blipFill>
+          <a:blip r:embed="rId2">
+            <a:extLst>
+              <a:ext uri="{28A0092B-C50C-407E-A947-70E740481C1C}">
+                <a14:useLocalDpi xmlns:a14="http://schemas.microsoft.com/office/drawing/2010/main" val="0"/>
+              </a:ext>
+            </a:extLst>
+          </a:blip>
+          <a:stretch>
+            <a:fillRect/>
+          </a:stretch>
+        </p:blipFill>
+        <p:spPr>
+          <a:xfrm>
+            <a:off x="776554" y="306000"/>
+            <a:ext cx="10638891" cy="6552000"/>
+          </a:xfrm>
+          <a:prstGeom prst="rect">
+            <a:avLst/>
+          </a:prstGeom>
+        </p:spPr>
+      </p:pic>
+    </p:spTree>
+    <p:extLst>
+      <p:ext uri="{BB962C8B-B14F-4D97-AF65-F5344CB8AC3E}">
+        <p14:creationId xmlns:p14="http://schemas.microsoft.com/office/powerpoint/2010/main" val="4117847281"/>
       </p:ext>
     </p:extLst>
   </p:cSld>
@@ -4418,6 +5781,666 @@
 </p:sld>
 </file>
 
+<file path=ppt/slides/slide40.xml><?xml version="1.0" encoding="utf-8"?>
+<p:sld xmlns:a="http://schemas.openxmlformats.org/drawingml/2006/main" xmlns:r="http://schemas.openxmlformats.org/officeDocument/2006/relationships" xmlns:p="http://schemas.openxmlformats.org/presentationml/2006/main">
+  <p:cSld>
+    <p:spTree>
+      <p:nvGrpSpPr>
+        <p:cNvPr id="1" name=""/>
+        <p:cNvGrpSpPr/>
+        <p:nvPr/>
+      </p:nvGrpSpPr>
+      <p:grpSpPr>
+        <a:xfrm>
+          <a:off x="0" y="0"/>
+          <a:ext cx="0" cy="0"/>
+          <a:chOff x="0" y="0"/>
+          <a:chExt cx="0" cy="0"/>
+        </a:xfrm>
+      </p:grpSpPr>
+      <p:pic>
+        <p:nvPicPr>
+          <p:cNvPr id="3" name="Grafik 2">
+            <a:extLst>
+              <a:ext uri="{FF2B5EF4-FFF2-40B4-BE49-F238E27FC236}">
+                <a16:creationId xmlns:a16="http://schemas.microsoft.com/office/drawing/2014/main" id="{E7EFE7F9-36D5-4AB7-A768-EABC62F899C9}"/>
+              </a:ext>
+            </a:extLst>
+          </p:cNvPr>
+          <p:cNvPicPr>
+            <a:picLocks noChangeAspect="1"/>
+          </p:cNvPicPr>
+          <p:nvPr/>
+        </p:nvPicPr>
+        <p:blipFill>
+          <a:blip r:embed="rId2">
+            <a:extLst>
+              <a:ext uri="{28A0092B-C50C-407E-A947-70E740481C1C}">
+                <a14:useLocalDpi xmlns:a14="http://schemas.microsoft.com/office/drawing/2010/main" val="0"/>
+              </a:ext>
+            </a:extLst>
+          </a:blip>
+          <a:stretch>
+            <a:fillRect/>
+          </a:stretch>
+        </p:blipFill>
+        <p:spPr>
+          <a:xfrm>
+            <a:off x="776554" y="306000"/>
+            <a:ext cx="10638891" cy="6552000"/>
+          </a:xfrm>
+          <a:prstGeom prst="rect">
+            <a:avLst/>
+          </a:prstGeom>
+        </p:spPr>
+      </p:pic>
+    </p:spTree>
+    <p:extLst>
+      <p:ext uri="{BB962C8B-B14F-4D97-AF65-F5344CB8AC3E}">
+        <p14:creationId xmlns:p14="http://schemas.microsoft.com/office/powerpoint/2010/main" val="4088778174"/>
+      </p:ext>
+    </p:extLst>
+  </p:cSld>
+  <p:clrMapOvr>
+    <a:masterClrMapping/>
+  </p:clrMapOvr>
+</p:sld>
+</file>
+
+<file path=ppt/slides/slide41.xml><?xml version="1.0" encoding="utf-8"?>
+<p:sld xmlns:a="http://schemas.openxmlformats.org/drawingml/2006/main" xmlns:r="http://schemas.openxmlformats.org/officeDocument/2006/relationships" xmlns:p="http://schemas.openxmlformats.org/presentationml/2006/main">
+  <p:cSld>
+    <p:spTree>
+      <p:nvGrpSpPr>
+        <p:cNvPr id="1" name=""/>
+        <p:cNvGrpSpPr/>
+        <p:nvPr/>
+      </p:nvGrpSpPr>
+      <p:grpSpPr>
+        <a:xfrm>
+          <a:off x="0" y="0"/>
+          <a:ext cx="0" cy="0"/>
+          <a:chOff x="0" y="0"/>
+          <a:chExt cx="0" cy="0"/>
+        </a:xfrm>
+      </p:grpSpPr>
+      <p:pic>
+        <p:nvPicPr>
+          <p:cNvPr id="3" name="Grafik 2">
+            <a:extLst>
+              <a:ext uri="{FF2B5EF4-FFF2-40B4-BE49-F238E27FC236}">
+                <a16:creationId xmlns:a16="http://schemas.microsoft.com/office/drawing/2014/main" id="{123C77B7-F9FF-433C-B387-741F1CD15113}"/>
+              </a:ext>
+            </a:extLst>
+          </p:cNvPr>
+          <p:cNvPicPr>
+            <a:picLocks noChangeAspect="1"/>
+          </p:cNvPicPr>
+          <p:nvPr/>
+        </p:nvPicPr>
+        <p:blipFill>
+          <a:blip r:embed="rId2">
+            <a:extLst>
+              <a:ext uri="{28A0092B-C50C-407E-A947-70E740481C1C}">
+                <a14:useLocalDpi xmlns:a14="http://schemas.microsoft.com/office/drawing/2010/main" val="0"/>
+              </a:ext>
+            </a:extLst>
+          </a:blip>
+          <a:stretch>
+            <a:fillRect/>
+          </a:stretch>
+        </p:blipFill>
+        <p:spPr>
+          <a:xfrm>
+            <a:off x="776554" y="306000"/>
+            <a:ext cx="10638891" cy="6552000"/>
+          </a:xfrm>
+          <a:prstGeom prst="rect">
+            <a:avLst/>
+          </a:prstGeom>
+        </p:spPr>
+      </p:pic>
+    </p:spTree>
+    <p:extLst>
+      <p:ext uri="{BB962C8B-B14F-4D97-AF65-F5344CB8AC3E}">
+        <p14:creationId xmlns:p14="http://schemas.microsoft.com/office/powerpoint/2010/main" val="2948140022"/>
+      </p:ext>
+    </p:extLst>
+  </p:cSld>
+  <p:clrMapOvr>
+    <a:masterClrMapping/>
+  </p:clrMapOvr>
+</p:sld>
+</file>
+
+<file path=ppt/slides/slide42.xml><?xml version="1.0" encoding="utf-8"?>
+<p:sld xmlns:a="http://schemas.openxmlformats.org/drawingml/2006/main" xmlns:r="http://schemas.openxmlformats.org/officeDocument/2006/relationships" xmlns:p="http://schemas.openxmlformats.org/presentationml/2006/main">
+  <p:cSld>
+    <p:spTree>
+      <p:nvGrpSpPr>
+        <p:cNvPr id="1" name=""/>
+        <p:cNvGrpSpPr/>
+        <p:nvPr/>
+      </p:nvGrpSpPr>
+      <p:grpSpPr>
+        <a:xfrm>
+          <a:off x="0" y="0"/>
+          <a:ext cx="0" cy="0"/>
+          <a:chOff x="0" y="0"/>
+          <a:chExt cx="0" cy="0"/>
+        </a:xfrm>
+      </p:grpSpPr>
+      <p:pic>
+        <p:nvPicPr>
+          <p:cNvPr id="3" name="Grafik 2">
+            <a:extLst>
+              <a:ext uri="{FF2B5EF4-FFF2-40B4-BE49-F238E27FC236}">
+                <a16:creationId xmlns:a16="http://schemas.microsoft.com/office/drawing/2014/main" id="{92883817-6741-4A51-8BAC-08763D981C3E}"/>
+              </a:ext>
+            </a:extLst>
+          </p:cNvPr>
+          <p:cNvPicPr>
+            <a:picLocks noChangeAspect="1"/>
+          </p:cNvPicPr>
+          <p:nvPr/>
+        </p:nvPicPr>
+        <p:blipFill>
+          <a:blip r:embed="rId2">
+            <a:extLst>
+              <a:ext uri="{28A0092B-C50C-407E-A947-70E740481C1C}">
+                <a14:useLocalDpi xmlns:a14="http://schemas.microsoft.com/office/drawing/2010/main" val="0"/>
+              </a:ext>
+            </a:extLst>
+          </a:blip>
+          <a:stretch>
+            <a:fillRect/>
+          </a:stretch>
+        </p:blipFill>
+        <p:spPr>
+          <a:xfrm>
+            <a:off x="776554" y="306000"/>
+            <a:ext cx="10638891" cy="6552000"/>
+          </a:xfrm>
+          <a:prstGeom prst="rect">
+            <a:avLst/>
+          </a:prstGeom>
+        </p:spPr>
+      </p:pic>
+    </p:spTree>
+    <p:extLst>
+      <p:ext uri="{BB962C8B-B14F-4D97-AF65-F5344CB8AC3E}">
+        <p14:creationId xmlns:p14="http://schemas.microsoft.com/office/powerpoint/2010/main" val="1739396249"/>
+      </p:ext>
+    </p:extLst>
+  </p:cSld>
+  <p:clrMapOvr>
+    <a:masterClrMapping/>
+  </p:clrMapOvr>
+</p:sld>
+</file>
+
+<file path=ppt/slides/slide43.xml><?xml version="1.0" encoding="utf-8"?>
+<p:sld xmlns:a="http://schemas.openxmlformats.org/drawingml/2006/main" xmlns:r="http://schemas.openxmlformats.org/officeDocument/2006/relationships" xmlns:p="http://schemas.openxmlformats.org/presentationml/2006/main">
+  <p:cSld>
+    <p:spTree>
+      <p:nvGrpSpPr>
+        <p:cNvPr id="1" name=""/>
+        <p:cNvGrpSpPr/>
+        <p:nvPr/>
+      </p:nvGrpSpPr>
+      <p:grpSpPr>
+        <a:xfrm>
+          <a:off x="0" y="0"/>
+          <a:ext cx="0" cy="0"/>
+          <a:chOff x="0" y="0"/>
+          <a:chExt cx="0" cy="0"/>
+        </a:xfrm>
+      </p:grpSpPr>
+      <p:pic>
+        <p:nvPicPr>
+          <p:cNvPr id="3" name="Grafik 2">
+            <a:extLst>
+              <a:ext uri="{FF2B5EF4-FFF2-40B4-BE49-F238E27FC236}">
+                <a16:creationId xmlns:a16="http://schemas.microsoft.com/office/drawing/2014/main" id="{964D8A2C-101D-4ED6-956D-AC548A7A66AA}"/>
+              </a:ext>
+            </a:extLst>
+          </p:cNvPr>
+          <p:cNvPicPr>
+            <a:picLocks noChangeAspect="1"/>
+          </p:cNvPicPr>
+          <p:nvPr/>
+        </p:nvPicPr>
+        <p:blipFill>
+          <a:blip r:embed="rId2">
+            <a:extLst>
+              <a:ext uri="{28A0092B-C50C-407E-A947-70E740481C1C}">
+                <a14:useLocalDpi xmlns:a14="http://schemas.microsoft.com/office/drawing/2010/main" val="0"/>
+              </a:ext>
+            </a:extLst>
+          </a:blip>
+          <a:stretch>
+            <a:fillRect/>
+          </a:stretch>
+        </p:blipFill>
+        <p:spPr>
+          <a:xfrm>
+            <a:off x="776554" y="306000"/>
+            <a:ext cx="10638891" cy="6552000"/>
+          </a:xfrm>
+          <a:prstGeom prst="rect">
+            <a:avLst/>
+          </a:prstGeom>
+        </p:spPr>
+      </p:pic>
+    </p:spTree>
+    <p:extLst>
+      <p:ext uri="{BB962C8B-B14F-4D97-AF65-F5344CB8AC3E}">
+        <p14:creationId xmlns:p14="http://schemas.microsoft.com/office/powerpoint/2010/main" val="3814987899"/>
+      </p:ext>
+    </p:extLst>
+  </p:cSld>
+  <p:clrMapOvr>
+    <a:masterClrMapping/>
+  </p:clrMapOvr>
+</p:sld>
+</file>
+
+<file path=ppt/slides/slide44.xml><?xml version="1.0" encoding="utf-8"?>
+<p:sld xmlns:a="http://schemas.openxmlformats.org/drawingml/2006/main" xmlns:r="http://schemas.openxmlformats.org/officeDocument/2006/relationships" xmlns:p="http://schemas.openxmlformats.org/presentationml/2006/main">
+  <p:cSld>
+    <p:spTree>
+      <p:nvGrpSpPr>
+        <p:cNvPr id="1" name=""/>
+        <p:cNvGrpSpPr/>
+        <p:nvPr/>
+      </p:nvGrpSpPr>
+      <p:grpSpPr>
+        <a:xfrm>
+          <a:off x="0" y="0"/>
+          <a:ext cx="0" cy="0"/>
+          <a:chOff x="0" y="0"/>
+          <a:chExt cx="0" cy="0"/>
+        </a:xfrm>
+      </p:grpSpPr>
+      <p:pic>
+        <p:nvPicPr>
+          <p:cNvPr id="3" name="Grafik 2">
+            <a:extLst>
+              <a:ext uri="{FF2B5EF4-FFF2-40B4-BE49-F238E27FC236}">
+                <a16:creationId xmlns:a16="http://schemas.microsoft.com/office/drawing/2014/main" id="{F2CCD83D-519E-4E4D-8398-5DB74C1C05AA}"/>
+              </a:ext>
+            </a:extLst>
+          </p:cNvPr>
+          <p:cNvPicPr>
+            <a:picLocks noChangeAspect="1"/>
+          </p:cNvPicPr>
+          <p:nvPr/>
+        </p:nvPicPr>
+        <p:blipFill>
+          <a:blip r:embed="rId2">
+            <a:extLst>
+              <a:ext uri="{28A0092B-C50C-407E-A947-70E740481C1C}">
+                <a14:useLocalDpi xmlns:a14="http://schemas.microsoft.com/office/drawing/2010/main" val="0"/>
+              </a:ext>
+            </a:extLst>
+          </a:blip>
+          <a:stretch>
+            <a:fillRect/>
+          </a:stretch>
+        </p:blipFill>
+        <p:spPr>
+          <a:xfrm>
+            <a:off x="776554" y="306000"/>
+            <a:ext cx="10638891" cy="6552000"/>
+          </a:xfrm>
+          <a:prstGeom prst="rect">
+            <a:avLst/>
+          </a:prstGeom>
+        </p:spPr>
+      </p:pic>
+    </p:spTree>
+    <p:extLst>
+      <p:ext uri="{BB962C8B-B14F-4D97-AF65-F5344CB8AC3E}">
+        <p14:creationId xmlns:p14="http://schemas.microsoft.com/office/powerpoint/2010/main" val="2751774563"/>
+      </p:ext>
+    </p:extLst>
+  </p:cSld>
+  <p:clrMapOvr>
+    <a:masterClrMapping/>
+  </p:clrMapOvr>
+</p:sld>
+</file>
+
+<file path=ppt/slides/slide45.xml><?xml version="1.0" encoding="utf-8"?>
+<p:sld xmlns:a="http://schemas.openxmlformats.org/drawingml/2006/main" xmlns:r="http://schemas.openxmlformats.org/officeDocument/2006/relationships" xmlns:p="http://schemas.openxmlformats.org/presentationml/2006/main">
+  <p:cSld>
+    <p:spTree>
+      <p:nvGrpSpPr>
+        <p:cNvPr id="1" name=""/>
+        <p:cNvGrpSpPr/>
+        <p:nvPr/>
+      </p:nvGrpSpPr>
+      <p:grpSpPr>
+        <a:xfrm>
+          <a:off x="0" y="0"/>
+          <a:ext cx="0" cy="0"/>
+          <a:chOff x="0" y="0"/>
+          <a:chExt cx="0" cy="0"/>
+        </a:xfrm>
+      </p:grpSpPr>
+      <p:pic>
+        <p:nvPicPr>
+          <p:cNvPr id="3" name="Grafik 2">
+            <a:extLst>
+              <a:ext uri="{FF2B5EF4-FFF2-40B4-BE49-F238E27FC236}">
+                <a16:creationId xmlns:a16="http://schemas.microsoft.com/office/drawing/2014/main" id="{71A1B9AE-7E7E-4FA7-9450-F107CABB6CE1}"/>
+              </a:ext>
+            </a:extLst>
+          </p:cNvPr>
+          <p:cNvPicPr>
+            <a:picLocks noChangeAspect="1"/>
+          </p:cNvPicPr>
+          <p:nvPr/>
+        </p:nvPicPr>
+        <p:blipFill>
+          <a:blip r:embed="rId2">
+            <a:extLst>
+              <a:ext uri="{28A0092B-C50C-407E-A947-70E740481C1C}">
+                <a14:useLocalDpi xmlns:a14="http://schemas.microsoft.com/office/drawing/2010/main" val="0"/>
+              </a:ext>
+            </a:extLst>
+          </a:blip>
+          <a:stretch>
+            <a:fillRect/>
+          </a:stretch>
+        </p:blipFill>
+        <p:spPr>
+          <a:xfrm>
+            <a:off x="776554" y="306000"/>
+            <a:ext cx="10638891" cy="6552000"/>
+          </a:xfrm>
+          <a:prstGeom prst="rect">
+            <a:avLst/>
+          </a:prstGeom>
+        </p:spPr>
+      </p:pic>
+    </p:spTree>
+    <p:extLst>
+      <p:ext uri="{BB962C8B-B14F-4D97-AF65-F5344CB8AC3E}">
+        <p14:creationId xmlns:p14="http://schemas.microsoft.com/office/powerpoint/2010/main" val="1914335789"/>
+      </p:ext>
+    </p:extLst>
+  </p:cSld>
+  <p:clrMapOvr>
+    <a:masterClrMapping/>
+  </p:clrMapOvr>
+</p:sld>
+</file>
+
+<file path=ppt/slides/slide46.xml><?xml version="1.0" encoding="utf-8"?>
+<p:sld xmlns:a="http://schemas.openxmlformats.org/drawingml/2006/main" xmlns:r="http://schemas.openxmlformats.org/officeDocument/2006/relationships" xmlns:p="http://schemas.openxmlformats.org/presentationml/2006/main">
+  <p:cSld>
+    <p:spTree>
+      <p:nvGrpSpPr>
+        <p:cNvPr id="1" name=""/>
+        <p:cNvGrpSpPr/>
+        <p:nvPr/>
+      </p:nvGrpSpPr>
+      <p:grpSpPr>
+        <a:xfrm>
+          <a:off x="0" y="0"/>
+          <a:ext cx="0" cy="0"/>
+          <a:chOff x="0" y="0"/>
+          <a:chExt cx="0" cy="0"/>
+        </a:xfrm>
+      </p:grpSpPr>
+      <p:pic>
+        <p:nvPicPr>
+          <p:cNvPr id="3" name="Grafik 2">
+            <a:extLst>
+              <a:ext uri="{FF2B5EF4-FFF2-40B4-BE49-F238E27FC236}">
+                <a16:creationId xmlns:a16="http://schemas.microsoft.com/office/drawing/2014/main" id="{CFD454D7-1C68-44D5-8B19-166F1350713E}"/>
+              </a:ext>
+            </a:extLst>
+          </p:cNvPr>
+          <p:cNvPicPr>
+            <a:picLocks noChangeAspect="1"/>
+          </p:cNvPicPr>
+          <p:nvPr/>
+        </p:nvPicPr>
+        <p:blipFill>
+          <a:blip r:embed="rId2">
+            <a:extLst>
+              <a:ext uri="{28A0092B-C50C-407E-A947-70E740481C1C}">
+                <a14:useLocalDpi xmlns:a14="http://schemas.microsoft.com/office/drawing/2010/main" val="0"/>
+              </a:ext>
+            </a:extLst>
+          </a:blip>
+          <a:stretch>
+            <a:fillRect/>
+          </a:stretch>
+        </p:blipFill>
+        <p:spPr>
+          <a:xfrm>
+            <a:off x="776554" y="306000"/>
+            <a:ext cx="10638891" cy="6552000"/>
+          </a:xfrm>
+          <a:prstGeom prst="rect">
+            <a:avLst/>
+          </a:prstGeom>
+        </p:spPr>
+      </p:pic>
+    </p:spTree>
+    <p:extLst>
+      <p:ext uri="{BB962C8B-B14F-4D97-AF65-F5344CB8AC3E}">
+        <p14:creationId xmlns:p14="http://schemas.microsoft.com/office/powerpoint/2010/main" val="3490191693"/>
+      </p:ext>
+    </p:extLst>
+  </p:cSld>
+  <p:clrMapOvr>
+    <a:masterClrMapping/>
+  </p:clrMapOvr>
+</p:sld>
+</file>
+
+<file path=ppt/slides/slide47.xml><?xml version="1.0" encoding="utf-8"?>
+<p:sld xmlns:a="http://schemas.openxmlformats.org/drawingml/2006/main" xmlns:r="http://schemas.openxmlformats.org/officeDocument/2006/relationships" xmlns:p="http://schemas.openxmlformats.org/presentationml/2006/main">
+  <p:cSld>
+    <p:spTree>
+      <p:nvGrpSpPr>
+        <p:cNvPr id="1" name=""/>
+        <p:cNvGrpSpPr/>
+        <p:nvPr/>
+      </p:nvGrpSpPr>
+      <p:grpSpPr>
+        <a:xfrm>
+          <a:off x="0" y="0"/>
+          <a:ext cx="0" cy="0"/>
+          <a:chOff x="0" y="0"/>
+          <a:chExt cx="0" cy="0"/>
+        </a:xfrm>
+      </p:grpSpPr>
+      <p:pic>
+        <p:nvPicPr>
+          <p:cNvPr id="3" name="Grafik 2">
+            <a:extLst>
+              <a:ext uri="{FF2B5EF4-FFF2-40B4-BE49-F238E27FC236}">
+                <a16:creationId xmlns:a16="http://schemas.microsoft.com/office/drawing/2014/main" id="{0481D642-5943-47D2-9550-BFF39C8633AD}"/>
+              </a:ext>
+            </a:extLst>
+          </p:cNvPr>
+          <p:cNvPicPr>
+            <a:picLocks noChangeAspect="1"/>
+          </p:cNvPicPr>
+          <p:nvPr/>
+        </p:nvPicPr>
+        <p:blipFill>
+          <a:blip r:embed="rId2">
+            <a:extLst>
+              <a:ext uri="{28A0092B-C50C-407E-A947-70E740481C1C}">
+                <a14:useLocalDpi xmlns:a14="http://schemas.microsoft.com/office/drawing/2010/main" val="0"/>
+              </a:ext>
+            </a:extLst>
+          </a:blip>
+          <a:stretch>
+            <a:fillRect/>
+          </a:stretch>
+        </p:blipFill>
+        <p:spPr>
+          <a:xfrm>
+            <a:off x="776554" y="306000"/>
+            <a:ext cx="10638891" cy="6552000"/>
+          </a:xfrm>
+          <a:prstGeom prst="rect">
+            <a:avLst/>
+          </a:prstGeom>
+        </p:spPr>
+      </p:pic>
+    </p:spTree>
+    <p:extLst>
+      <p:ext uri="{BB962C8B-B14F-4D97-AF65-F5344CB8AC3E}">
+        <p14:creationId xmlns:p14="http://schemas.microsoft.com/office/powerpoint/2010/main" val="375507343"/>
+      </p:ext>
+    </p:extLst>
+  </p:cSld>
+  <p:clrMapOvr>
+    <a:masterClrMapping/>
+  </p:clrMapOvr>
+</p:sld>
+</file>
+
+<file path=ppt/slides/slide48.xml><?xml version="1.0" encoding="utf-8"?>
+<p:sld xmlns:a="http://schemas.openxmlformats.org/drawingml/2006/main" xmlns:r="http://schemas.openxmlformats.org/officeDocument/2006/relationships" xmlns:p="http://schemas.openxmlformats.org/presentationml/2006/main">
+  <p:cSld>
+    <p:spTree>
+      <p:nvGrpSpPr>
+        <p:cNvPr id="1" name=""/>
+        <p:cNvGrpSpPr/>
+        <p:nvPr/>
+      </p:nvGrpSpPr>
+      <p:grpSpPr>
+        <a:xfrm>
+          <a:off x="0" y="0"/>
+          <a:ext cx="0" cy="0"/>
+          <a:chOff x="0" y="0"/>
+          <a:chExt cx="0" cy="0"/>
+        </a:xfrm>
+      </p:grpSpPr>
+      <p:pic>
+        <p:nvPicPr>
+          <p:cNvPr id="3" name="Grafik 2">
+            <a:extLst>
+              <a:ext uri="{FF2B5EF4-FFF2-40B4-BE49-F238E27FC236}">
+                <a16:creationId xmlns:a16="http://schemas.microsoft.com/office/drawing/2014/main" id="{98BB2294-6993-433A-9778-352EC2CE4EBB}"/>
+              </a:ext>
+            </a:extLst>
+          </p:cNvPr>
+          <p:cNvPicPr>
+            <a:picLocks noChangeAspect="1"/>
+          </p:cNvPicPr>
+          <p:nvPr/>
+        </p:nvPicPr>
+        <p:blipFill>
+          <a:blip r:embed="rId2">
+            <a:extLst>
+              <a:ext uri="{28A0092B-C50C-407E-A947-70E740481C1C}">
+                <a14:useLocalDpi xmlns:a14="http://schemas.microsoft.com/office/drawing/2010/main" val="0"/>
+              </a:ext>
+            </a:extLst>
+          </a:blip>
+          <a:stretch>
+            <a:fillRect/>
+          </a:stretch>
+        </p:blipFill>
+        <p:spPr>
+          <a:xfrm>
+            <a:off x="776554" y="306000"/>
+            <a:ext cx="10638891" cy="6552000"/>
+          </a:xfrm>
+          <a:prstGeom prst="rect">
+            <a:avLst/>
+          </a:prstGeom>
+        </p:spPr>
+      </p:pic>
+    </p:spTree>
+    <p:extLst>
+      <p:ext uri="{BB962C8B-B14F-4D97-AF65-F5344CB8AC3E}">
+        <p14:creationId xmlns:p14="http://schemas.microsoft.com/office/powerpoint/2010/main" val="3171947911"/>
+      </p:ext>
+    </p:extLst>
+  </p:cSld>
+  <p:clrMapOvr>
+    <a:masterClrMapping/>
+  </p:clrMapOvr>
+</p:sld>
+</file>
+
+<file path=ppt/slides/slide49.xml><?xml version="1.0" encoding="utf-8"?>
+<p:sld xmlns:a="http://schemas.openxmlformats.org/drawingml/2006/main" xmlns:r="http://schemas.openxmlformats.org/officeDocument/2006/relationships" xmlns:p="http://schemas.openxmlformats.org/presentationml/2006/main">
+  <p:cSld>
+    <p:spTree>
+      <p:nvGrpSpPr>
+        <p:cNvPr id="1" name=""/>
+        <p:cNvGrpSpPr/>
+        <p:nvPr/>
+      </p:nvGrpSpPr>
+      <p:grpSpPr>
+        <a:xfrm>
+          <a:off x="0" y="0"/>
+          <a:ext cx="0" cy="0"/>
+          <a:chOff x="0" y="0"/>
+          <a:chExt cx="0" cy="0"/>
+        </a:xfrm>
+      </p:grpSpPr>
+      <p:pic>
+        <p:nvPicPr>
+          <p:cNvPr id="3" name="Grafik 2">
+            <a:extLst>
+              <a:ext uri="{FF2B5EF4-FFF2-40B4-BE49-F238E27FC236}">
+                <a16:creationId xmlns:a16="http://schemas.microsoft.com/office/drawing/2014/main" id="{FA7A5A9C-C139-4FFF-8172-8E45321D2B4A}"/>
+              </a:ext>
+            </a:extLst>
+          </p:cNvPr>
+          <p:cNvPicPr>
+            <a:picLocks noChangeAspect="1"/>
+          </p:cNvPicPr>
+          <p:nvPr/>
+        </p:nvPicPr>
+        <p:blipFill>
+          <a:blip r:embed="rId2">
+            <a:extLst>
+              <a:ext uri="{28A0092B-C50C-407E-A947-70E740481C1C}">
+                <a14:useLocalDpi xmlns:a14="http://schemas.microsoft.com/office/drawing/2010/main" val="0"/>
+              </a:ext>
+            </a:extLst>
+          </a:blip>
+          <a:stretch>
+            <a:fillRect/>
+          </a:stretch>
+        </p:blipFill>
+        <p:spPr>
+          <a:xfrm>
+            <a:off x="776554" y="306000"/>
+            <a:ext cx="10638891" cy="6552000"/>
+          </a:xfrm>
+          <a:prstGeom prst="rect">
+            <a:avLst/>
+          </a:prstGeom>
+        </p:spPr>
+      </p:pic>
+    </p:spTree>
+    <p:extLst>
+      <p:ext uri="{BB962C8B-B14F-4D97-AF65-F5344CB8AC3E}">
+        <p14:creationId xmlns:p14="http://schemas.microsoft.com/office/powerpoint/2010/main" val="2999412725"/>
+      </p:ext>
+    </p:extLst>
+  </p:cSld>
+  <p:clrMapOvr>
+    <a:masterClrMapping/>
+  </p:clrMapOvr>
+</p:sld>
+</file>
+
 <file path=ppt/slides/slide5.xml><?xml version="1.0" encoding="utf-8"?>
 <p:sld xmlns:a="http://schemas.openxmlformats.org/drawingml/2006/main" xmlns:r="http://schemas.openxmlformats.org/officeDocument/2006/relationships" xmlns:p="http://schemas.openxmlformats.org/presentationml/2006/main">
   <p:cSld>
@@ -4475,6 +6498,666 @@
     <p:extLst>
       <p:ext uri="{BB962C8B-B14F-4D97-AF65-F5344CB8AC3E}">
         <p14:creationId xmlns:p14="http://schemas.microsoft.com/office/powerpoint/2010/main" val="3440145442"/>
+      </p:ext>
+    </p:extLst>
+  </p:cSld>
+  <p:clrMapOvr>
+    <a:masterClrMapping/>
+  </p:clrMapOvr>
+</p:sld>
+</file>
+
+<file path=ppt/slides/slide50.xml><?xml version="1.0" encoding="utf-8"?>
+<p:sld xmlns:a="http://schemas.openxmlformats.org/drawingml/2006/main" xmlns:r="http://schemas.openxmlformats.org/officeDocument/2006/relationships" xmlns:p="http://schemas.openxmlformats.org/presentationml/2006/main">
+  <p:cSld>
+    <p:spTree>
+      <p:nvGrpSpPr>
+        <p:cNvPr id="1" name=""/>
+        <p:cNvGrpSpPr/>
+        <p:nvPr/>
+      </p:nvGrpSpPr>
+      <p:grpSpPr>
+        <a:xfrm>
+          <a:off x="0" y="0"/>
+          <a:ext cx="0" cy="0"/>
+          <a:chOff x="0" y="0"/>
+          <a:chExt cx="0" cy="0"/>
+        </a:xfrm>
+      </p:grpSpPr>
+      <p:pic>
+        <p:nvPicPr>
+          <p:cNvPr id="3" name="Grafik 2">
+            <a:extLst>
+              <a:ext uri="{FF2B5EF4-FFF2-40B4-BE49-F238E27FC236}">
+                <a16:creationId xmlns:a16="http://schemas.microsoft.com/office/drawing/2014/main" id="{A21A8053-4DBB-4566-86D3-DF2046414998}"/>
+              </a:ext>
+            </a:extLst>
+          </p:cNvPr>
+          <p:cNvPicPr>
+            <a:picLocks noChangeAspect="1"/>
+          </p:cNvPicPr>
+          <p:nvPr/>
+        </p:nvPicPr>
+        <p:blipFill>
+          <a:blip r:embed="rId2">
+            <a:extLst>
+              <a:ext uri="{28A0092B-C50C-407E-A947-70E740481C1C}">
+                <a14:useLocalDpi xmlns:a14="http://schemas.microsoft.com/office/drawing/2010/main" val="0"/>
+              </a:ext>
+            </a:extLst>
+          </a:blip>
+          <a:stretch>
+            <a:fillRect/>
+          </a:stretch>
+        </p:blipFill>
+        <p:spPr>
+          <a:xfrm>
+            <a:off x="1261258" y="306000"/>
+            <a:ext cx="9669484" cy="6552000"/>
+          </a:xfrm>
+          <a:prstGeom prst="rect">
+            <a:avLst/>
+          </a:prstGeom>
+        </p:spPr>
+      </p:pic>
+    </p:spTree>
+    <p:extLst>
+      <p:ext uri="{BB962C8B-B14F-4D97-AF65-F5344CB8AC3E}">
+        <p14:creationId xmlns:p14="http://schemas.microsoft.com/office/powerpoint/2010/main" val="1727194043"/>
+      </p:ext>
+    </p:extLst>
+  </p:cSld>
+  <p:clrMapOvr>
+    <a:masterClrMapping/>
+  </p:clrMapOvr>
+</p:sld>
+</file>
+
+<file path=ppt/slides/slide51.xml><?xml version="1.0" encoding="utf-8"?>
+<p:sld xmlns:a="http://schemas.openxmlformats.org/drawingml/2006/main" xmlns:r="http://schemas.openxmlformats.org/officeDocument/2006/relationships" xmlns:p="http://schemas.openxmlformats.org/presentationml/2006/main">
+  <p:cSld>
+    <p:spTree>
+      <p:nvGrpSpPr>
+        <p:cNvPr id="1" name=""/>
+        <p:cNvGrpSpPr/>
+        <p:nvPr/>
+      </p:nvGrpSpPr>
+      <p:grpSpPr>
+        <a:xfrm>
+          <a:off x="0" y="0"/>
+          <a:ext cx="0" cy="0"/>
+          <a:chOff x="0" y="0"/>
+          <a:chExt cx="0" cy="0"/>
+        </a:xfrm>
+      </p:grpSpPr>
+      <p:pic>
+        <p:nvPicPr>
+          <p:cNvPr id="3" name="Grafik 2">
+            <a:extLst>
+              <a:ext uri="{FF2B5EF4-FFF2-40B4-BE49-F238E27FC236}">
+                <a16:creationId xmlns:a16="http://schemas.microsoft.com/office/drawing/2014/main" id="{BEB64302-1DE8-4BFB-9078-9BF4874F2108}"/>
+              </a:ext>
+            </a:extLst>
+          </p:cNvPr>
+          <p:cNvPicPr>
+            <a:picLocks noChangeAspect="1"/>
+          </p:cNvPicPr>
+          <p:nvPr/>
+        </p:nvPicPr>
+        <p:blipFill>
+          <a:blip r:embed="rId2">
+            <a:extLst>
+              <a:ext uri="{28A0092B-C50C-407E-A947-70E740481C1C}">
+                <a14:useLocalDpi xmlns:a14="http://schemas.microsoft.com/office/drawing/2010/main" val="0"/>
+              </a:ext>
+            </a:extLst>
+          </a:blip>
+          <a:stretch>
+            <a:fillRect/>
+          </a:stretch>
+        </p:blipFill>
+        <p:spPr>
+          <a:xfrm>
+            <a:off x="1261258" y="306000"/>
+            <a:ext cx="9669484" cy="6552000"/>
+          </a:xfrm>
+          <a:prstGeom prst="rect">
+            <a:avLst/>
+          </a:prstGeom>
+        </p:spPr>
+      </p:pic>
+    </p:spTree>
+    <p:extLst>
+      <p:ext uri="{BB962C8B-B14F-4D97-AF65-F5344CB8AC3E}">
+        <p14:creationId xmlns:p14="http://schemas.microsoft.com/office/powerpoint/2010/main" val="1012225801"/>
+      </p:ext>
+    </p:extLst>
+  </p:cSld>
+  <p:clrMapOvr>
+    <a:masterClrMapping/>
+  </p:clrMapOvr>
+</p:sld>
+</file>
+
+<file path=ppt/slides/slide52.xml><?xml version="1.0" encoding="utf-8"?>
+<p:sld xmlns:a="http://schemas.openxmlformats.org/drawingml/2006/main" xmlns:r="http://schemas.openxmlformats.org/officeDocument/2006/relationships" xmlns:p="http://schemas.openxmlformats.org/presentationml/2006/main">
+  <p:cSld>
+    <p:spTree>
+      <p:nvGrpSpPr>
+        <p:cNvPr id="1" name=""/>
+        <p:cNvGrpSpPr/>
+        <p:nvPr/>
+      </p:nvGrpSpPr>
+      <p:grpSpPr>
+        <a:xfrm>
+          <a:off x="0" y="0"/>
+          <a:ext cx="0" cy="0"/>
+          <a:chOff x="0" y="0"/>
+          <a:chExt cx="0" cy="0"/>
+        </a:xfrm>
+      </p:grpSpPr>
+      <p:pic>
+        <p:nvPicPr>
+          <p:cNvPr id="3" name="Grafik 2">
+            <a:extLst>
+              <a:ext uri="{FF2B5EF4-FFF2-40B4-BE49-F238E27FC236}">
+                <a16:creationId xmlns:a16="http://schemas.microsoft.com/office/drawing/2014/main" id="{2B46128D-E3F6-4632-8313-82D9D0DF03A5}"/>
+              </a:ext>
+            </a:extLst>
+          </p:cNvPr>
+          <p:cNvPicPr>
+            <a:picLocks noChangeAspect="1"/>
+          </p:cNvPicPr>
+          <p:nvPr/>
+        </p:nvPicPr>
+        <p:blipFill>
+          <a:blip r:embed="rId2">
+            <a:extLst>
+              <a:ext uri="{28A0092B-C50C-407E-A947-70E740481C1C}">
+                <a14:useLocalDpi xmlns:a14="http://schemas.microsoft.com/office/drawing/2010/main" val="0"/>
+              </a:ext>
+            </a:extLst>
+          </a:blip>
+          <a:stretch>
+            <a:fillRect/>
+          </a:stretch>
+        </p:blipFill>
+        <p:spPr>
+          <a:xfrm>
+            <a:off x="1261258" y="306000"/>
+            <a:ext cx="9669484" cy="6552000"/>
+          </a:xfrm>
+          <a:prstGeom prst="rect">
+            <a:avLst/>
+          </a:prstGeom>
+        </p:spPr>
+      </p:pic>
+    </p:spTree>
+    <p:extLst>
+      <p:ext uri="{BB962C8B-B14F-4D97-AF65-F5344CB8AC3E}">
+        <p14:creationId xmlns:p14="http://schemas.microsoft.com/office/powerpoint/2010/main" val="2225156658"/>
+      </p:ext>
+    </p:extLst>
+  </p:cSld>
+  <p:clrMapOvr>
+    <a:masterClrMapping/>
+  </p:clrMapOvr>
+</p:sld>
+</file>
+
+<file path=ppt/slides/slide53.xml><?xml version="1.0" encoding="utf-8"?>
+<p:sld xmlns:a="http://schemas.openxmlformats.org/drawingml/2006/main" xmlns:r="http://schemas.openxmlformats.org/officeDocument/2006/relationships" xmlns:p="http://schemas.openxmlformats.org/presentationml/2006/main">
+  <p:cSld>
+    <p:spTree>
+      <p:nvGrpSpPr>
+        <p:cNvPr id="1" name=""/>
+        <p:cNvGrpSpPr/>
+        <p:nvPr/>
+      </p:nvGrpSpPr>
+      <p:grpSpPr>
+        <a:xfrm>
+          <a:off x="0" y="0"/>
+          <a:ext cx="0" cy="0"/>
+          <a:chOff x="0" y="0"/>
+          <a:chExt cx="0" cy="0"/>
+        </a:xfrm>
+      </p:grpSpPr>
+      <p:pic>
+        <p:nvPicPr>
+          <p:cNvPr id="3" name="Grafik 2">
+            <a:extLst>
+              <a:ext uri="{FF2B5EF4-FFF2-40B4-BE49-F238E27FC236}">
+                <a16:creationId xmlns:a16="http://schemas.microsoft.com/office/drawing/2014/main" id="{3075C148-F4EE-49F2-892E-EA2F9494575F}"/>
+              </a:ext>
+            </a:extLst>
+          </p:cNvPr>
+          <p:cNvPicPr>
+            <a:picLocks noChangeAspect="1"/>
+          </p:cNvPicPr>
+          <p:nvPr/>
+        </p:nvPicPr>
+        <p:blipFill>
+          <a:blip r:embed="rId2">
+            <a:extLst>
+              <a:ext uri="{28A0092B-C50C-407E-A947-70E740481C1C}">
+                <a14:useLocalDpi xmlns:a14="http://schemas.microsoft.com/office/drawing/2010/main" val="0"/>
+              </a:ext>
+            </a:extLst>
+          </a:blip>
+          <a:stretch>
+            <a:fillRect/>
+          </a:stretch>
+        </p:blipFill>
+        <p:spPr>
+          <a:xfrm>
+            <a:off x="1261258" y="306000"/>
+            <a:ext cx="9669484" cy="6552000"/>
+          </a:xfrm>
+          <a:prstGeom prst="rect">
+            <a:avLst/>
+          </a:prstGeom>
+        </p:spPr>
+      </p:pic>
+    </p:spTree>
+    <p:extLst>
+      <p:ext uri="{BB962C8B-B14F-4D97-AF65-F5344CB8AC3E}">
+        <p14:creationId xmlns:p14="http://schemas.microsoft.com/office/powerpoint/2010/main" val="2531843303"/>
+      </p:ext>
+    </p:extLst>
+  </p:cSld>
+  <p:clrMapOvr>
+    <a:masterClrMapping/>
+  </p:clrMapOvr>
+</p:sld>
+</file>
+
+<file path=ppt/slides/slide54.xml><?xml version="1.0" encoding="utf-8"?>
+<p:sld xmlns:a="http://schemas.openxmlformats.org/drawingml/2006/main" xmlns:r="http://schemas.openxmlformats.org/officeDocument/2006/relationships" xmlns:p="http://schemas.openxmlformats.org/presentationml/2006/main">
+  <p:cSld>
+    <p:spTree>
+      <p:nvGrpSpPr>
+        <p:cNvPr id="1" name=""/>
+        <p:cNvGrpSpPr/>
+        <p:nvPr/>
+      </p:nvGrpSpPr>
+      <p:grpSpPr>
+        <a:xfrm>
+          <a:off x="0" y="0"/>
+          <a:ext cx="0" cy="0"/>
+          <a:chOff x="0" y="0"/>
+          <a:chExt cx="0" cy="0"/>
+        </a:xfrm>
+      </p:grpSpPr>
+      <p:pic>
+        <p:nvPicPr>
+          <p:cNvPr id="3" name="Grafik 2">
+            <a:extLst>
+              <a:ext uri="{FF2B5EF4-FFF2-40B4-BE49-F238E27FC236}">
+                <a16:creationId xmlns:a16="http://schemas.microsoft.com/office/drawing/2014/main" id="{2D75C20E-64CD-40CC-8F0A-594979C22659}"/>
+              </a:ext>
+            </a:extLst>
+          </p:cNvPr>
+          <p:cNvPicPr>
+            <a:picLocks noChangeAspect="1"/>
+          </p:cNvPicPr>
+          <p:nvPr/>
+        </p:nvPicPr>
+        <p:blipFill>
+          <a:blip r:embed="rId2">
+            <a:extLst>
+              <a:ext uri="{28A0092B-C50C-407E-A947-70E740481C1C}">
+                <a14:useLocalDpi xmlns:a14="http://schemas.microsoft.com/office/drawing/2010/main" val="0"/>
+              </a:ext>
+            </a:extLst>
+          </a:blip>
+          <a:stretch>
+            <a:fillRect/>
+          </a:stretch>
+        </p:blipFill>
+        <p:spPr>
+          <a:xfrm>
+            <a:off x="1261258" y="306000"/>
+            <a:ext cx="9669484" cy="6552000"/>
+          </a:xfrm>
+          <a:prstGeom prst="rect">
+            <a:avLst/>
+          </a:prstGeom>
+        </p:spPr>
+      </p:pic>
+    </p:spTree>
+    <p:extLst>
+      <p:ext uri="{BB962C8B-B14F-4D97-AF65-F5344CB8AC3E}">
+        <p14:creationId xmlns:p14="http://schemas.microsoft.com/office/powerpoint/2010/main" val="86036917"/>
+      </p:ext>
+    </p:extLst>
+  </p:cSld>
+  <p:clrMapOvr>
+    <a:masterClrMapping/>
+  </p:clrMapOvr>
+</p:sld>
+</file>
+
+<file path=ppt/slides/slide55.xml><?xml version="1.0" encoding="utf-8"?>
+<p:sld xmlns:a="http://schemas.openxmlformats.org/drawingml/2006/main" xmlns:r="http://schemas.openxmlformats.org/officeDocument/2006/relationships" xmlns:p="http://schemas.openxmlformats.org/presentationml/2006/main">
+  <p:cSld>
+    <p:spTree>
+      <p:nvGrpSpPr>
+        <p:cNvPr id="1" name=""/>
+        <p:cNvGrpSpPr/>
+        <p:nvPr/>
+      </p:nvGrpSpPr>
+      <p:grpSpPr>
+        <a:xfrm>
+          <a:off x="0" y="0"/>
+          <a:ext cx="0" cy="0"/>
+          <a:chOff x="0" y="0"/>
+          <a:chExt cx="0" cy="0"/>
+        </a:xfrm>
+      </p:grpSpPr>
+      <p:pic>
+        <p:nvPicPr>
+          <p:cNvPr id="3" name="Grafik 2">
+            <a:extLst>
+              <a:ext uri="{FF2B5EF4-FFF2-40B4-BE49-F238E27FC236}">
+                <a16:creationId xmlns:a16="http://schemas.microsoft.com/office/drawing/2014/main" id="{C3EA840B-6A6D-4CFD-BA1C-FBAD29FC109D}"/>
+              </a:ext>
+            </a:extLst>
+          </p:cNvPr>
+          <p:cNvPicPr>
+            <a:picLocks noChangeAspect="1"/>
+          </p:cNvPicPr>
+          <p:nvPr/>
+        </p:nvPicPr>
+        <p:blipFill>
+          <a:blip r:embed="rId2">
+            <a:extLst>
+              <a:ext uri="{28A0092B-C50C-407E-A947-70E740481C1C}">
+                <a14:useLocalDpi xmlns:a14="http://schemas.microsoft.com/office/drawing/2010/main" val="0"/>
+              </a:ext>
+            </a:extLst>
+          </a:blip>
+          <a:stretch>
+            <a:fillRect/>
+          </a:stretch>
+        </p:blipFill>
+        <p:spPr>
+          <a:xfrm>
+            <a:off x="1261258" y="306000"/>
+            <a:ext cx="9669484" cy="6552000"/>
+          </a:xfrm>
+          <a:prstGeom prst="rect">
+            <a:avLst/>
+          </a:prstGeom>
+        </p:spPr>
+      </p:pic>
+    </p:spTree>
+    <p:extLst>
+      <p:ext uri="{BB962C8B-B14F-4D97-AF65-F5344CB8AC3E}">
+        <p14:creationId xmlns:p14="http://schemas.microsoft.com/office/powerpoint/2010/main" val="3032359441"/>
+      </p:ext>
+    </p:extLst>
+  </p:cSld>
+  <p:clrMapOvr>
+    <a:masterClrMapping/>
+  </p:clrMapOvr>
+</p:sld>
+</file>
+
+<file path=ppt/slides/slide56.xml><?xml version="1.0" encoding="utf-8"?>
+<p:sld xmlns:a="http://schemas.openxmlformats.org/drawingml/2006/main" xmlns:r="http://schemas.openxmlformats.org/officeDocument/2006/relationships" xmlns:p="http://schemas.openxmlformats.org/presentationml/2006/main">
+  <p:cSld>
+    <p:spTree>
+      <p:nvGrpSpPr>
+        <p:cNvPr id="1" name=""/>
+        <p:cNvGrpSpPr/>
+        <p:nvPr/>
+      </p:nvGrpSpPr>
+      <p:grpSpPr>
+        <a:xfrm>
+          <a:off x="0" y="0"/>
+          <a:ext cx="0" cy="0"/>
+          <a:chOff x="0" y="0"/>
+          <a:chExt cx="0" cy="0"/>
+        </a:xfrm>
+      </p:grpSpPr>
+      <p:pic>
+        <p:nvPicPr>
+          <p:cNvPr id="3" name="Grafik 2">
+            <a:extLst>
+              <a:ext uri="{FF2B5EF4-FFF2-40B4-BE49-F238E27FC236}">
+                <a16:creationId xmlns:a16="http://schemas.microsoft.com/office/drawing/2014/main" id="{B5A1CBBC-2888-4892-8CC0-501023D6576C}"/>
+              </a:ext>
+            </a:extLst>
+          </p:cNvPr>
+          <p:cNvPicPr>
+            <a:picLocks noChangeAspect="1"/>
+          </p:cNvPicPr>
+          <p:nvPr/>
+        </p:nvPicPr>
+        <p:blipFill>
+          <a:blip r:embed="rId2">
+            <a:extLst>
+              <a:ext uri="{28A0092B-C50C-407E-A947-70E740481C1C}">
+                <a14:useLocalDpi xmlns:a14="http://schemas.microsoft.com/office/drawing/2010/main" val="0"/>
+              </a:ext>
+            </a:extLst>
+          </a:blip>
+          <a:stretch>
+            <a:fillRect/>
+          </a:stretch>
+        </p:blipFill>
+        <p:spPr>
+          <a:xfrm>
+            <a:off x="1261258" y="306000"/>
+            <a:ext cx="9669484" cy="6552000"/>
+          </a:xfrm>
+          <a:prstGeom prst="rect">
+            <a:avLst/>
+          </a:prstGeom>
+        </p:spPr>
+      </p:pic>
+    </p:spTree>
+    <p:extLst>
+      <p:ext uri="{BB962C8B-B14F-4D97-AF65-F5344CB8AC3E}">
+        <p14:creationId xmlns:p14="http://schemas.microsoft.com/office/powerpoint/2010/main" val="823307118"/>
+      </p:ext>
+    </p:extLst>
+  </p:cSld>
+  <p:clrMapOvr>
+    <a:masterClrMapping/>
+  </p:clrMapOvr>
+</p:sld>
+</file>
+
+<file path=ppt/slides/slide57.xml><?xml version="1.0" encoding="utf-8"?>
+<p:sld xmlns:a="http://schemas.openxmlformats.org/drawingml/2006/main" xmlns:r="http://schemas.openxmlformats.org/officeDocument/2006/relationships" xmlns:p="http://schemas.openxmlformats.org/presentationml/2006/main">
+  <p:cSld>
+    <p:spTree>
+      <p:nvGrpSpPr>
+        <p:cNvPr id="1" name=""/>
+        <p:cNvGrpSpPr/>
+        <p:nvPr/>
+      </p:nvGrpSpPr>
+      <p:grpSpPr>
+        <a:xfrm>
+          <a:off x="0" y="0"/>
+          <a:ext cx="0" cy="0"/>
+          <a:chOff x="0" y="0"/>
+          <a:chExt cx="0" cy="0"/>
+        </a:xfrm>
+      </p:grpSpPr>
+      <p:pic>
+        <p:nvPicPr>
+          <p:cNvPr id="3" name="Grafik 2">
+            <a:extLst>
+              <a:ext uri="{FF2B5EF4-FFF2-40B4-BE49-F238E27FC236}">
+                <a16:creationId xmlns:a16="http://schemas.microsoft.com/office/drawing/2014/main" id="{668F813D-FEE7-4BB4-975C-CB9D49480EA1}"/>
+              </a:ext>
+            </a:extLst>
+          </p:cNvPr>
+          <p:cNvPicPr>
+            <a:picLocks noChangeAspect="1"/>
+          </p:cNvPicPr>
+          <p:nvPr/>
+        </p:nvPicPr>
+        <p:blipFill>
+          <a:blip r:embed="rId2">
+            <a:extLst>
+              <a:ext uri="{28A0092B-C50C-407E-A947-70E740481C1C}">
+                <a14:useLocalDpi xmlns:a14="http://schemas.microsoft.com/office/drawing/2010/main" val="0"/>
+              </a:ext>
+            </a:extLst>
+          </a:blip>
+          <a:stretch>
+            <a:fillRect/>
+          </a:stretch>
+        </p:blipFill>
+        <p:spPr>
+          <a:xfrm>
+            <a:off x="1261258" y="306000"/>
+            <a:ext cx="9669484" cy="6552000"/>
+          </a:xfrm>
+          <a:prstGeom prst="rect">
+            <a:avLst/>
+          </a:prstGeom>
+        </p:spPr>
+      </p:pic>
+    </p:spTree>
+    <p:extLst>
+      <p:ext uri="{BB962C8B-B14F-4D97-AF65-F5344CB8AC3E}">
+        <p14:creationId xmlns:p14="http://schemas.microsoft.com/office/powerpoint/2010/main" val="1348040017"/>
+      </p:ext>
+    </p:extLst>
+  </p:cSld>
+  <p:clrMapOvr>
+    <a:masterClrMapping/>
+  </p:clrMapOvr>
+</p:sld>
+</file>
+
+<file path=ppt/slides/slide58.xml><?xml version="1.0" encoding="utf-8"?>
+<p:sld xmlns:a="http://schemas.openxmlformats.org/drawingml/2006/main" xmlns:r="http://schemas.openxmlformats.org/officeDocument/2006/relationships" xmlns:p="http://schemas.openxmlformats.org/presentationml/2006/main">
+  <p:cSld>
+    <p:spTree>
+      <p:nvGrpSpPr>
+        <p:cNvPr id="1" name=""/>
+        <p:cNvGrpSpPr/>
+        <p:nvPr/>
+      </p:nvGrpSpPr>
+      <p:grpSpPr>
+        <a:xfrm>
+          <a:off x="0" y="0"/>
+          <a:ext cx="0" cy="0"/>
+          <a:chOff x="0" y="0"/>
+          <a:chExt cx="0" cy="0"/>
+        </a:xfrm>
+      </p:grpSpPr>
+      <p:pic>
+        <p:nvPicPr>
+          <p:cNvPr id="3" name="Grafik 2">
+            <a:extLst>
+              <a:ext uri="{FF2B5EF4-FFF2-40B4-BE49-F238E27FC236}">
+                <a16:creationId xmlns:a16="http://schemas.microsoft.com/office/drawing/2014/main" id="{F0946E6F-879B-4536-B585-91E0323F7931}"/>
+              </a:ext>
+            </a:extLst>
+          </p:cNvPr>
+          <p:cNvPicPr>
+            <a:picLocks noChangeAspect="1"/>
+          </p:cNvPicPr>
+          <p:nvPr/>
+        </p:nvPicPr>
+        <p:blipFill>
+          <a:blip r:embed="rId2">
+            <a:extLst>
+              <a:ext uri="{28A0092B-C50C-407E-A947-70E740481C1C}">
+                <a14:useLocalDpi xmlns:a14="http://schemas.microsoft.com/office/drawing/2010/main" val="0"/>
+              </a:ext>
+            </a:extLst>
+          </a:blip>
+          <a:stretch>
+            <a:fillRect/>
+          </a:stretch>
+        </p:blipFill>
+        <p:spPr>
+          <a:xfrm>
+            <a:off x="730582" y="306000"/>
+            <a:ext cx="10730835" cy="6552000"/>
+          </a:xfrm>
+          <a:prstGeom prst="rect">
+            <a:avLst/>
+          </a:prstGeom>
+        </p:spPr>
+      </p:pic>
+    </p:spTree>
+    <p:extLst>
+      <p:ext uri="{BB962C8B-B14F-4D97-AF65-F5344CB8AC3E}">
+        <p14:creationId xmlns:p14="http://schemas.microsoft.com/office/powerpoint/2010/main" val="4210936950"/>
+      </p:ext>
+    </p:extLst>
+  </p:cSld>
+  <p:clrMapOvr>
+    <a:masterClrMapping/>
+  </p:clrMapOvr>
+</p:sld>
+</file>
+
+<file path=ppt/slides/slide59.xml><?xml version="1.0" encoding="utf-8"?>
+<p:sld xmlns:a="http://schemas.openxmlformats.org/drawingml/2006/main" xmlns:r="http://schemas.openxmlformats.org/officeDocument/2006/relationships" xmlns:p="http://schemas.openxmlformats.org/presentationml/2006/main">
+  <p:cSld>
+    <p:spTree>
+      <p:nvGrpSpPr>
+        <p:cNvPr id="1" name=""/>
+        <p:cNvGrpSpPr/>
+        <p:nvPr/>
+      </p:nvGrpSpPr>
+      <p:grpSpPr>
+        <a:xfrm>
+          <a:off x="0" y="0"/>
+          <a:ext cx="0" cy="0"/>
+          <a:chOff x="0" y="0"/>
+          <a:chExt cx="0" cy="0"/>
+        </a:xfrm>
+      </p:grpSpPr>
+      <p:pic>
+        <p:nvPicPr>
+          <p:cNvPr id="3" name="Grafik 2">
+            <a:extLst>
+              <a:ext uri="{FF2B5EF4-FFF2-40B4-BE49-F238E27FC236}">
+                <a16:creationId xmlns:a16="http://schemas.microsoft.com/office/drawing/2014/main" id="{7AC40901-69B4-4FD8-AF2E-D17CA41AD79E}"/>
+              </a:ext>
+            </a:extLst>
+          </p:cNvPr>
+          <p:cNvPicPr>
+            <a:picLocks noChangeAspect="1"/>
+          </p:cNvPicPr>
+          <p:nvPr/>
+        </p:nvPicPr>
+        <p:blipFill>
+          <a:blip r:embed="rId2">
+            <a:extLst>
+              <a:ext uri="{28A0092B-C50C-407E-A947-70E740481C1C}">
+                <a14:useLocalDpi xmlns:a14="http://schemas.microsoft.com/office/drawing/2010/main" val="0"/>
+              </a:ext>
+            </a:extLst>
+          </a:blip>
+          <a:stretch>
+            <a:fillRect/>
+          </a:stretch>
+        </p:blipFill>
+        <p:spPr>
+          <a:xfrm>
+            <a:off x="730582" y="306000"/>
+            <a:ext cx="10730835" cy="6552000"/>
+          </a:xfrm>
+          <a:prstGeom prst="rect">
+            <a:avLst/>
+          </a:prstGeom>
+        </p:spPr>
+      </p:pic>
+    </p:spTree>
+    <p:extLst>
+      <p:ext uri="{BB962C8B-B14F-4D97-AF65-F5344CB8AC3E}">
+        <p14:creationId xmlns:p14="http://schemas.microsoft.com/office/powerpoint/2010/main" val="1322798610"/>
       </p:ext>
     </p:extLst>
   </p:cSld>
@@ -4541,6 +7224,204 @@
     <p:extLst>
       <p:ext uri="{BB962C8B-B14F-4D97-AF65-F5344CB8AC3E}">
         <p14:creationId xmlns:p14="http://schemas.microsoft.com/office/powerpoint/2010/main" val="2425096587"/>
+      </p:ext>
+    </p:extLst>
+  </p:cSld>
+  <p:clrMapOvr>
+    <a:masterClrMapping/>
+  </p:clrMapOvr>
+</p:sld>
+</file>
+
+<file path=ppt/slides/slide60.xml><?xml version="1.0" encoding="utf-8"?>
+<p:sld xmlns:a="http://schemas.openxmlformats.org/drawingml/2006/main" xmlns:r="http://schemas.openxmlformats.org/officeDocument/2006/relationships" xmlns:p="http://schemas.openxmlformats.org/presentationml/2006/main">
+  <p:cSld>
+    <p:spTree>
+      <p:nvGrpSpPr>
+        <p:cNvPr id="1" name=""/>
+        <p:cNvGrpSpPr/>
+        <p:nvPr/>
+      </p:nvGrpSpPr>
+      <p:grpSpPr>
+        <a:xfrm>
+          <a:off x="0" y="0"/>
+          <a:ext cx="0" cy="0"/>
+          <a:chOff x="0" y="0"/>
+          <a:chExt cx="0" cy="0"/>
+        </a:xfrm>
+      </p:grpSpPr>
+      <p:pic>
+        <p:nvPicPr>
+          <p:cNvPr id="3" name="Grafik 2">
+            <a:extLst>
+              <a:ext uri="{FF2B5EF4-FFF2-40B4-BE49-F238E27FC236}">
+                <a16:creationId xmlns:a16="http://schemas.microsoft.com/office/drawing/2014/main" id="{3C86EEA8-3C66-4C60-854F-192DC5A391EF}"/>
+              </a:ext>
+            </a:extLst>
+          </p:cNvPr>
+          <p:cNvPicPr>
+            <a:picLocks noChangeAspect="1"/>
+          </p:cNvPicPr>
+          <p:nvPr/>
+        </p:nvPicPr>
+        <p:blipFill>
+          <a:blip r:embed="rId2">
+            <a:extLst>
+              <a:ext uri="{28A0092B-C50C-407E-A947-70E740481C1C}">
+                <a14:useLocalDpi xmlns:a14="http://schemas.microsoft.com/office/drawing/2010/main" val="0"/>
+              </a:ext>
+            </a:extLst>
+          </a:blip>
+          <a:stretch>
+            <a:fillRect/>
+          </a:stretch>
+        </p:blipFill>
+        <p:spPr>
+          <a:xfrm>
+            <a:off x="730582" y="306000"/>
+            <a:ext cx="10730835" cy="6552000"/>
+          </a:xfrm>
+          <a:prstGeom prst="rect">
+            <a:avLst/>
+          </a:prstGeom>
+        </p:spPr>
+      </p:pic>
+    </p:spTree>
+    <p:extLst>
+      <p:ext uri="{BB962C8B-B14F-4D97-AF65-F5344CB8AC3E}">
+        <p14:creationId xmlns:p14="http://schemas.microsoft.com/office/powerpoint/2010/main" val="2166615856"/>
+      </p:ext>
+    </p:extLst>
+  </p:cSld>
+  <p:clrMapOvr>
+    <a:masterClrMapping/>
+  </p:clrMapOvr>
+</p:sld>
+</file>
+
+<file path=ppt/slides/slide61.xml><?xml version="1.0" encoding="utf-8"?>
+<p:sld xmlns:a="http://schemas.openxmlformats.org/drawingml/2006/main" xmlns:r="http://schemas.openxmlformats.org/officeDocument/2006/relationships" xmlns:p="http://schemas.openxmlformats.org/presentationml/2006/main">
+  <p:cSld>
+    <p:spTree>
+      <p:nvGrpSpPr>
+        <p:cNvPr id="1" name=""/>
+        <p:cNvGrpSpPr/>
+        <p:nvPr/>
+      </p:nvGrpSpPr>
+      <p:grpSpPr>
+        <a:xfrm>
+          <a:off x="0" y="0"/>
+          <a:ext cx="0" cy="0"/>
+          <a:chOff x="0" y="0"/>
+          <a:chExt cx="0" cy="0"/>
+        </a:xfrm>
+      </p:grpSpPr>
+      <p:pic>
+        <p:nvPicPr>
+          <p:cNvPr id="3" name="Grafik 2">
+            <a:extLst>
+              <a:ext uri="{FF2B5EF4-FFF2-40B4-BE49-F238E27FC236}">
+                <a16:creationId xmlns:a16="http://schemas.microsoft.com/office/drawing/2014/main" id="{6A3344C9-7B65-4A5D-9FC4-FD1455BD3380}"/>
+              </a:ext>
+            </a:extLst>
+          </p:cNvPr>
+          <p:cNvPicPr>
+            <a:picLocks noChangeAspect="1"/>
+          </p:cNvPicPr>
+          <p:nvPr/>
+        </p:nvPicPr>
+        <p:blipFill>
+          <a:blip r:embed="rId2">
+            <a:extLst>
+              <a:ext uri="{28A0092B-C50C-407E-A947-70E740481C1C}">
+                <a14:useLocalDpi xmlns:a14="http://schemas.microsoft.com/office/drawing/2010/main" val="0"/>
+              </a:ext>
+            </a:extLst>
+          </a:blip>
+          <a:stretch>
+            <a:fillRect/>
+          </a:stretch>
+        </p:blipFill>
+        <p:spPr>
+          <a:xfrm>
+            <a:off x="730582" y="306000"/>
+            <a:ext cx="10730835" cy="6552000"/>
+          </a:xfrm>
+          <a:prstGeom prst="rect">
+            <a:avLst/>
+          </a:prstGeom>
+        </p:spPr>
+      </p:pic>
+    </p:spTree>
+    <p:extLst>
+      <p:ext uri="{BB962C8B-B14F-4D97-AF65-F5344CB8AC3E}">
+        <p14:creationId xmlns:p14="http://schemas.microsoft.com/office/powerpoint/2010/main" val="2403895251"/>
+      </p:ext>
+    </p:extLst>
+  </p:cSld>
+  <p:clrMapOvr>
+    <a:masterClrMapping/>
+  </p:clrMapOvr>
+</p:sld>
+</file>
+
+<file path=ppt/slides/slide62.xml><?xml version="1.0" encoding="utf-8"?>
+<p:sld xmlns:a="http://schemas.openxmlformats.org/drawingml/2006/main" xmlns:r="http://schemas.openxmlformats.org/officeDocument/2006/relationships" xmlns:p="http://schemas.openxmlformats.org/presentationml/2006/main">
+  <p:cSld>
+    <p:spTree>
+      <p:nvGrpSpPr>
+        <p:cNvPr id="1" name=""/>
+        <p:cNvGrpSpPr/>
+        <p:nvPr/>
+      </p:nvGrpSpPr>
+      <p:grpSpPr>
+        <a:xfrm>
+          <a:off x="0" y="0"/>
+          <a:ext cx="0" cy="0"/>
+          <a:chOff x="0" y="0"/>
+          <a:chExt cx="0" cy="0"/>
+        </a:xfrm>
+      </p:grpSpPr>
+      <p:pic>
+        <p:nvPicPr>
+          <p:cNvPr id="3" name="Grafik 2">
+            <a:extLst>
+              <a:ext uri="{FF2B5EF4-FFF2-40B4-BE49-F238E27FC236}">
+                <a16:creationId xmlns:a16="http://schemas.microsoft.com/office/drawing/2014/main" id="{C640C9CC-1FA7-459E-93C2-B96BCB4197CB}"/>
+              </a:ext>
+            </a:extLst>
+          </p:cNvPr>
+          <p:cNvPicPr>
+            <a:picLocks noChangeAspect="1"/>
+          </p:cNvPicPr>
+          <p:nvPr/>
+        </p:nvPicPr>
+        <p:blipFill>
+          <a:blip r:embed="rId2">
+            <a:extLst>
+              <a:ext uri="{28A0092B-C50C-407E-A947-70E740481C1C}">
+                <a14:useLocalDpi xmlns:a14="http://schemas.microsoft.com/office/drawing/2010/main" val="0"/>
+              </a:ext>
+            </a:extLst>
+          </a:blip>
+          <a:stretch>
+            <a:fillRect/>
+          </a:stretch>
+        </p:blipFill>
+        <p:spPr>
+          <a:xfrm>
+            <a:off x="730582" y="306000"/>
+            <a:ext cx="10730835" cy="6552000"/>
+          </a:xfrm>
+          <a:prstGeom prst="rect">
+            <a:avLst/>
+          </a:prstGeom>
+        </p:spPr>
+      </p:pic>
+    </p:spTree>
+    <p:extLst>
+      <p:ext uri="{BB962C8B-B14F-4D97-AF65-F5344CB8AC3E}">
+        <p14:creationId xmlns:p14="http://schemas.microsoft.com/office/powerpoint/2010/main" val="3952854179"/>
       </p:ext>
     </p:extLst>
   </p:cSld>

</xml_diff>